<commit_message>
Merge contributor orientation guide to CONTRIBUTING.md and update content
</commit_message>
<xml_diff>
--- a/docs/images/RolesAndTechnologies.pptx
+++ b/docs/images/RolesAndTechnologies.pptx
@@ -10,14 +10,14 @@
   <p:sldIdLst>
     <p:sldId id="256" r:id="rId2"/>
   </p:sldIdLst>
-  <p:sldSz cx="7561263" cy="2592388"/>
+  <p:sldSz cx="6480175" cy="2879725"/>
   <p:notesSz cx="6858000" cy="9144000"/>
   <p:defaultTextStyle>
     <a:defPPr>
       <a:defRPr lang="en-US"/>
     </a:defPPr>
-    <a:lvl1pPr marL="0" algn="l" defTabSz="755294" rtl="0" eaLnBrk="1" latinLnBrk="0" hangingPunct="1">
-      <a:defRPr sz="1500" kern="1200">
+    <a:lvl1pPr marL="0" algn="l" defTabSz="735141" rtl="0" eaLnBrk="1" latinLnBrk="0" hangingPunct="1">
+      <a:defRPr sz="1459" kern="1200">
         <a:solidFill>
           <a:schemeClr val="tx1"/>
         </a:solidFill>
@@ -26,8 +26,8 @@
         <a:cs typeface="+mn-cs"/>
       </a:defRPr>
     </a:lvl1pPr>
-    <a:lvl2pPr marL="377647" algn="l" defTabSz="755294" rtl="0" eaLnBrk="1" latinLnBrk="0" hangingPunct="1">
-      <a:defRPr sz="1500" kern="1200">
+    <a:lvl2pPr marL="367571" algn="l" defTabSz="735141" rtl="0" eaLnBrk="1" latinLnBrk="0" hangingPunct="1">
+      <a:defRPr sz="1459" kern="1200">
         <a:solidFill>
           <a:schemeClr val="tx1"/>
         </a:solidFill>
@@ -36,8 +36,8 @@
         <a:cs typeface="+mn-cs"/>
       </a:defRPr>
     </a:lvl2pPr>
-    <a:lvl3pPr marL="755294" algn="l" defTabSz="755294" rtl="0" eaLnBrk="1" latinLnBrk="0" hangingPunct="1">
-      <a:defRPr sz="1500" kern="1200">
+    <a:lvl3pPr marL="735141" algn="l" defTabSz="735141" rtl="0" eaLnBrk="1" latinLnBrk="0" hangingPunct="1">
+      <a:defRPr sz="1459" kern="1200">
         <a:solidFill>
           <a:schemeClr val="tx1"/>
         </a:solidFill>
@@ -46,8 +46,8 @@
         <a:cs typeface="+mn-cs"/>
       </a:defRPr>
     </a:lvl3pPr>
-    <a:lvl4pPr marL="1132942" algn="l" defTabSz="755294" rtl="0" eaLnBrk="1" latinLnBrk="0" hangingPunct="1">
-      <a:defRPr sz="1500" kern="1200">
+    <a:lvl4pPr marL="1102713" algn="l" defTabSz="735141" rtl="0" eaLnBrk="1" latinLnBrk="0" hangingPunct="1">
+      <a:defRPr sz="1459" kern="1200">
         <a:solidFill>
           <a:schemeClr val="tx1"/>
         </a:solidFill>
@@ -56,8 +56,8 @@
         <a:cs typeface="+mn-cs"/>
       </a:defRPr>
     </a:lvl4pPr>
-    <a:lvl5pPr marL="1510589" algn="l" defTabSz="755294" rtl="0" eaLnBrk="1" latinLnBrk="0" hangingPunct="1">
-      <a:defRPr sz="1500" kern="1200">
+    <a:lvl5pPr marL="1470283" algn="l" defTabSz="735141" rtl="0" eaLnBrk="1" latinLnBrk="0" hangingPunct="1">
+      <a:defRPr sz="1459" kern="1200">
         <a:solidFill>
           <a:schemeClr val="tx1"/>
         </a:solidFill>
@@ -66,8 +66,8 @@
         <a:cs typeface="+mn-cs"/>
       </a:defRPr>
     </a:lvl5pPr>
-    <a:lvl6pPr marL="1888236" algn="l" defTabSz="755294" rtl="0" eaLnBrk="1" latinLnBrk="0" hangingPunct="1">
-      <a:defRPr sz="1500" kern="1200">
+    <a:lvl6pPr marL="1837854" algn="l" defTabSz="735141" rtl="0" eaLnBrk="1" latinLnBrk="0" hangingPunct="1">
+      <a:defRPr sz="1459" kern="1200">
         <a:solidFill>
           <a:schemeClr val="tx1"/>
         </a:solidFill>
@@ -76,8 +76,8 @@
         <a:cs typeface="+mn-cs"/>
       </a:defRPr>
     </a:lvl6pPr>
-    <a:lvl7pPr marL="2265883" algn="l" defTabSz="755294" rtl="0" eaLnBrk="1" latinLnBrk="0" hangingPunct="1">
-      <a:defRPr sz="1500" kern="1200">
+    <a:lvl7pPr marL="2205424" algn="l" defTabSz="735141" rtl="0" eaLnBrk="1" latinLnBrk="0" hangingPunct="1">
+      <a:defRPr sz="1459" kern="1200">
         <a:solidFill>
           <a:schemeClr val="tx1"/>
         </a:solidFill>
@@ -86,8 +86,8 @@
         <a:cs typeface="+mn-cs"/>
       </a:defRPr>
     </a:lvl7pPr>
-    <a:lvl8pPr marL="2643530" algn="l" defTabSz="755294" rtl="0" eaLnBrk="1" latinLnBrk="0" hangingPunct="1">
-      <a:defRPr sz="1500" kern="1200">
+    <a:lvl8pPr marL="2572995" algn="l" defTabSz="735141" rtl="0" eaLnBrk="1" latinLnBrk="0" hangingPunct="1">
+      <a:defRPr sz="1459" kern="1200">
         <a:solidFill>
           <a:schemeClr val="tx1"/>
         </a:solidFill>
@@ -96,8 +96,8 @@
         <a:cs typeface="+mn-cs"/>
       </a:defRPr>
     </a:lvl8pPr>
-    <a:lvl9pPr marL="3021178" algn="l" defTabSz="755294" rtl="0" eaLnBrk="1" latinLnBrk="0" hangingPunct="1">
-      <a:defRPr sz="1500" kern="1200">
+    <a:lvl9pPr marL="2940566" algn="l" defTabSz="735141" rtl="0" eaLnBrk="1" latinLnBrk="0" hangingPunct="1">
+      <a:defRPr sz="1459" kern="1200">
         <a:solidFill>
           <a:schemeClr val="tx1"/>
         </a:solidFill>
@@ -110,12 +110,12 @@
   <p:extLst>
     <p:ext uri="{EFAFB233-063F-42B5-8137-9DF3F51BA10A}">
       <p15:sldGuideLst xmlns:p15="http://schemas.microsoft.com/office/powerpoint/2012/main">
-        <p15:guide id="1" orient="horz" pos="817">
+        <p15:guide id="1" orient="horz" pos="907" userDrawn="1">
           <p15:clr>
             <a:srgbClr val="A4A3A4"/>
           </p15:clr>
         </p15:guide>
-        <p15:guide id="2" pos="2382">
+        <p15:guide id="2" pos="2041" userDrawn="1">
           <p15:clr>
             <a:srgbClr val="A4A3A4"/>
           </p15:clr>
@@ -208,7 +208,7 @@
           <a:p>
             <a:fld id="{EB56B9F1-9881-483D-AC17-B3C6E9A32E68}" type="datetimeFigureOut">
               <a:rPr lang="en-SG" smtClean="0"/>
-              <a:t>5/8/2015</a:t>
+              <a:t>18/3/2018</a:t>
             </a:fld>
             <a:endParaRPr lang="en-SG"/>
           </a:p>
@@ -226,8 +226,8 @@
         </p:nvSpPr>
         <p:spPr>
           <a:xfrm>
-            <a:off x="-1571625" y="685800"/>
-            <a:ext cx="10001250" cy="3429000"/>
+            <a:off x="-428625" y="685800"/>
+            <a:ext cx="7715250" cy="3429000"/>
           </a:xfrm>
           <a:prstGeom prst="rect">
             <a:avLst/>
@@ -382,8 +382,8 @@
   </p:cSld>
   <p:clrMap bg1="lt1" tx1="dk1" bg2="lt2" tx2="dk2" accent1="accent1" accent2="accent2" accent3="accent3" accent4="accent4" accent5="accent5" accent6="accent6" hlink="hlink" folHlink="folHlink"/>
   <p:notesStyle>
-    <a:lvl1pPr marL="0" algn="l" defTabSz="755294" rtl="0" eaLnBrk="1" latinLnBrk="0" hangingPunct="1">
-      <a:defRPr sz="1000" kern="1200">
+    <a:lvl1pPr marL="0" algn="l" defTabSz="735141" rtl="0" eaLnBrk="1" latinLnBrk="0" hangingPunct="1">
+      <a:defRPr sz="973" kern="1200">
         <a:solidFill>
           <a:schemeClr val="tx1"/>
         </a:solidFill>
@@ -392,8 +392,8 @@
         <a:cs typeface="+mn-cs"/>
       </a:defRPr>
     </a:lvl1pPr>
-    <a:lvl2pPr marL="377647" algn="l" defTabSz="755294" rtl="0" eaLnBrk="1" latinLnBrk="0" hangingPunct="1">
-      <a:defRPr sz="1000" kern="1200">
+    <a:lvl2pPr marL="367571" algn="l" defTabSz="735141" rtl="0" eaLnBrk="1" latinLnBrk="0" hangingPunct="1">
+      <a:defRPr sz="973" kern="1200">
         <a:solidFill>
           <a:schemeClr val="tx1"/>
         </a:solidFill>
@@ -402,8 +402,8 @@
         <a:cs typeface="+mn-cs"/>
       </a:defRPr>
     </a:lvl2pPr>
-    <a:lvl3pPr marL="755294" algn="l" defTabSz="755294" rtl="0" eaLnBrk="1" latinLnBrk="0" hangingPunct="1">
-      <a:defRPr sz="1000" kern="1200">
+    <a:lvl3pPr marL="735141" algn="l" defTabSz="735141" rtl="0" eaLnBrk="1" latinLnBrk="0" hangingPunct="1">
+      <a:defRPr sz="973" kern="1200">
         <a:solidFill>
           <a:schemeClr val="tx1"/>
         </a:solidFill>
@@ -412,8 +412,8 @@
         <a:cs typeface="+mn-cs"/>
       </a:defRPr>
     </a:lvl3pPr>
-    <a:lvl4pPr marL="1132942" algn="l" defTabSz="755294" rtl="0" eaLnBrk="1" latinLnBrk="0" hangingPunct="1">
-      <a:defRPr sz="1000" kern="1200">
+    <a:lvl4pPr marL="1102713" algn="l" defTabSz="735141" rtl="0" eaLnBrk="1" latinLnBrk="0" hangingPunct="1">
+      <a:defRPr sz="973" kern="1200">
         <a:solidFill>
           <a:schemeClr val="tx1"/>
         </a:solidFill>
@@ -422,8 +422,8 @@
         <a:cs typeface="+mn-cs"/>
       </a:defRPr>
     </a:lvl4pPr>
-    <a:lvl5pPr marL="1510589" algn="l" defTabSz="755294" rtl="0" eaLnBrk="1" latinLnBrk="0" hangingPunct="1">
-      <a:defRPr sz="1000" kern="1200">
+    <a:lvl5pPr marL="1470283" algn="l" defTabSz="735141" rtl="0" eaLnBrk="1" latinLnBrk="0" hangingPunct="1">
+      <a:defRPr sz="973" kern="1200">
         <a:solidFill>
           <a:schemeClr val="tx1"/>
         </a:solidFill>
@@ -432,8 +432,8 @@
         <a:cs typeface="+mn-cs"/>
       </a:defRPr>
     </a:lvl5pPr>
-    <a:lvl6pPr marL="1888236" algn="l" defTabSz="755294" rtl="0" eaLnBrk="1" latinLnBrk="0" hangingPunct="1">
-      <a:defRPr sz="1000" kern="1200">
+    <a:lvl6pPr marL="1837854" algn="l" defTabSz="735141" rtl="0" eaLnBrk="1" latinLnBrk="0" hangingPunct="1">
+      <a:defRPr sz="973" kern="1200">
         <a:solidFill>
           <a:schemeClr val="tx1"/>
         </a:solidFill>
@@ -442,8 +442,8 @@
         <a:cs typeface="+mn-cs"/>
       </a:defRPr>
     </a:lvl6pPr>
-    <a:lvl7pPr marL="2265883" algn="l" defTabSz="755294" rtl="0" eaLnBrk="1" latinLnBrk="0" hangingPunct="1">
-      <a:defRPr sz="1000" kern="1200">
+    <a:lvl7pPr marL="2205424" algn="l" defTabSz="735141" rtl="0" eaLnBrk="1" latinLnBrk="0" hangingPunct="1">
+      <a:defRPr sz="973" kern="1200">
         <a:solidFill>
           <a:schemeClr val="tx1"/>
         </a:solidFill>
@@ -452,8 +452,8 @@
         <a:cs typeface="+mn-cs"/>
       </a:defRPr>
     </a:lvl7pPr>
-    <a:lvl8pPr marL="2643530" algn="l" defTabSz="755294" rtl="0" eaLnBrk="1" latinLnBrk="0" hangingPunct="1">
-      <a:defRPr sz="1000" kern="1200">
+    <a:lvl8pPr marL="2572995" algn="l" defTabSz="735141" rtl="0" eaLnBrk="1" latinLnBrk="0" hangingPunct="1">
+      <a:defRPr sz="973" kern="1200">
         <a:solidFill>
           <a:schemeClr val="tx1"/>
         </a:solidFill>
@@ -462,8 +462,8 @@
         <a:cs typeface="+mn-cs"/>
       </a:defRPr>
     </a:lvl8pPr>
-    <a:lvl9pPr marL="3021178" algn="l" defTabSz="755294" rtl="0" eaLnBrk="1" latinLnBrk="0" hangingPunct="1">
-      <a:defRPr sz="1000" kern="1200">
+    <a:lvl9pPr marL="2940566" algn="l" defTabSz="735141" rtl="0" eaLnBrk="1" latinLnBrk="0" hangingPunct="1">
+      <a:defRPr sz="973" kern="1200">
         <a:solidFill>
           <a:schemeClr val="tx1"/>
         </a:solidFill>
@@ -505,8 +505,8 @@
         </p:nvSpPr>
         <p:spPr>
           <a:xfrm>
-            <a:off x="-1571625" y="685800"/>
-            <a:ext cx="10001250" cy="3429000"/>
+            <a:off x="-428625" y="685800"/>
+            <a:ext cx="7715250" cy="3429000"/>
           </a:xfrm>
         </p:spPr>
       </p:sp>
@@ -594,8 +594,8 @@
         </p:nvSpPr>
         <p:spPr>
           <a:xfrm>
-            <a:off x="567096" y="805322"/>
-            <a:ext cx="6427074" cy="555684"/>
+            <a:off x="486016" y="894583"/>
+            <a:ext cx="5508149" cy="617276"/>
           </a:xfrm>
         </p:spPr>
         <p:txBody>
@@ -622,8 +622,8 @@
         </p:nvSpPr>
         <p:spPr>
           <a:xfrm>
-            <a:off x="1134190" y="1469021"/>
-            <a:ext cx="5292884" cy="662499"/>
+            <a:off x="972030" y="1631848"/>
+            <a:ext cx="4536122" cy="735929"/>
           </a:xfrm>
         </p:spPr>
         <p:txBody>
@@ -639,7 +639,7 @@
                 </a:solidFill>
               </a:defRPr>
             </a:lvl1pPr>
-            <a:lvl2pPr marL="377647" indent="0" algn="ctr">
+            <a:lvl2pPr marL="377643" indent="0" algn="ctr">
               <a:buNone/>
               <a:defRPr>
                 <a:solidFill>
@@ -649,7 +649,7 @@
                 </a:solidFill>
               </a:defRPr>
             </a:lvl2pPr>
-            <a:lvl3pPr marL="755294" indent="0" algn="ctr">
+            <a:lvl3pPr marL="755285" indent="0" algn="ctr">
               <a:buNone/>
               <a:defRPr>
                 <a:solidFill>
@@ -659,7 +659,7 @@
                 </a:solidFill>
               </a:defRPr>
             </a:lvl3pPr>
-            <a:lvl4pPr marL="1132942" indent="0" algn="ctr">
+            <a:lvl4pPr marL="1132930" indent="0" algn="ctr">
               <a:buNone/>
               <a:defRPr>
                 <a:solidFill>
@@ -669,7 +669,7 @@
                 </a:solidFill>
               </a:defRPr>
             </a:lvl4pPr>
-            <a:lvl5pPr marL="1510589" indent="0" algn="ctr">
+            <a:lvl5pPr marL="1510573" indent="0" algn="ctr">
               <a:buNone/>
               <a:defRPr>
                 <a:solidFill>
@@ -679,7 +679,7 @@
                 </a:solidFill>
               </a:defRPr>
             </a:lvl5pPr>
-            <a:lvl6pPr marL="1888236" indent="0" algn="ctr">
+            <a:lvl6pPr marL="1888215" indent="0" algn="ctr">
               <a:buNone/>
               <a:defRPr>
                 <a:solidFill>
@@ -689,7 +689,7 @@
                 </a:solidFill>
               </a:defRPr>
             </a:lvl6pPr>
-            <a:lvl7pPr marL="2265883" indent="0" algn="ctr">
+            <a:lvl7pPr marL="2265858" indent="0" algn="ctr">
               <a:buNone/>
               <a:defRPr>
                 <a:solidFill>
@@ -699,7 +699,7 @@
                 </a:solidFill>
               </a:defRPr>
             </a:lvl7pPr>
-            <a:lvl8pPr marL="2643530" indent="0" algn="ctr">
+            <a:lvl8pPr marL="2643500" indent="0" algn="ctr">
               <a:buNone/>
               <a:defRPr>
                 <a:solidFill>
@@ -709,7 +709,7 @@
                 </a:solidFill>
               </a:defRPr>
             </a:lvl8pPr>
-            <a:lvl9pPr marL="3021178" indent="0" algn="ctr">
+            <a:lvl9pPr marL="3021144" indent="0" algn="ctr">
               <a:buNone/>
               <a:defRPr>
                 <a:solidFill>
@@ -747,7 +747,7 @@
             <a:fld id="{1D8BD707-D9CF-40AE-B4C6-C98DA3205C09}" type="datetimeFigureOut">
               <a:rPr lang="en-US" smtClean="0"/>
               <a:pPr/>
-              <a:t>8/5/2015</a:t>
+              <a:t>3/18/2018</a:t>
             </a:fld>
             <a:endParaRPr lang="en-US"/>
           </a:p>
@@ -914,7 +914,7 @@
             <a:fld id="{1D8BD707-D9CF-40AE-B4C6-C98DA3205C09}" type="datetimeFigureOut">
               <a:rPr lang="en-US" smtClean="0"/>
               <a:pPr/>
-              <a:t>8/5/2015</a:t>
+              <a:t>3/18/2018</a:t>
             </a:fld>
             <a:endParaRPr lang="en-US"/>
           </a:p>
@@ -1000,8 +1000,8 @@
         </p:nvSpPr>
         <p:spPr>
           <a:xfrm>
-            <a:off x="5481919" y="103817"/>
-            <a:ext cx="1701285" cy="2211930"/>
+            <a:off x="4698134" y="115323"/>
+            <a:ext cx="1458040" cy="2457098"/>
           </a:xfrm>
         </p:spPr>
         <p:txBody>
@@ -1028,8 +1028,8 @@
         </p:nvSpPr>
         <p:spPr>
           <a:xfrm>
-            <a:off x="378064" y="103817"/>
-            <a:ext cx="4977832" cy="2211930"/>
+            <a:off x="324011" y="115323"/>
+            <a:ext cx="4266116" cy="2457098"/>
           </a:xfrm>
         </p:spPr>
         <p:txBody>
@@ -1091,7 +1091,7 @@
             <a:fld id="{1D8BD707-D9CF-40AE-B4C6-C98DA3205C09}" type="datetimeFigureOut">
               <a:rPr lang="en-US" smtClean="0"/>
               <a:pPr/>
-              <a:t>8/5/2015</a:t>
+              <a:t>3/18/2018</a:t>
             </a:fld>
             <a:endParaRPr lang="en-US"/>
           </a:p>
@@ -1258,7 +1258,7 @@
             <a:fld id="{1D8BD707-D9CF-40AE-B4C6-C98DA3205C09}" type="datetimeFigureOut">
               <a:rPr lang="en-US" smtClean="0"/>
               <a:pPr/>
-              <a:t>8/5/2015</a:t>
+              <a:t>3/18/2018</a:t>
             </a:fld>
             <a:endParaRPr lang="en-US"/>
           </a:p>
@@ -1344,8 +1344,8 @@
         </p:nvSpPr>
         <p:spPr>
           <a:xfrm>
-            <a:off x="597289" y="1665852"/>
-            <a:ext cx="6427074" cy="514877"/>
+            <a:off x="511892" y="1850499"/>
+            <a:ext cx="5508149" cy="571945"/>
           </a:xfrm>
         </p:spPr>
         <p:txBody>
@@ -1376,8 +1376,8 @@
         </p:nvSpPr>
         <p:spPr>
           <a:xfrm>
-            <a:off x="597289" y="1098766"/>
-            <a:ext cx="6427074" cy="567085"/>
+            <a:off x="511892" y="1220554"/>
+            <a:ext cx="5508149" cy="629940"/>
           </a:xfrm>
         </p:spPr>
         <p:txBody>
@@ -1393,7 +1393,7 @@
                 </a:solidFill>
               </a:defRPr>
             </a:lvl1pPr>
-            <a:lvl2pPr marL="377647" indent="0">
+            <a:lvl2pPr marL="377643" indent="0">
               <a:buNone/>
               <a:defRPr sz="1500">
                 <a:solidFill>
@@ -1403,9 +1403,9 @@
                 </a:solidFill>
               </a:defRPr>
             </a:lvl2pPr>
-            <a:lvl3pPr marL="755294" indent="0">
-              <a:buNone/>
-              <a:defRPr sz="1300">
+            <a:lvl3pPr marL="755285" indent="0">
+              <a:buNone/>
+              <a:defRPr sz="1299">
                 <a:solidFill>
                   <a:schemeClr val="tx1">
                     <a:tint val="75000"/>
@@ -1413,7 +1413,7 @@
                 </a:solidFill>
               </a:defRPr>
             </a:lvl3pPr>
-            <a:lvl4pPr marL="1132942" indent="0">
+            <a:lvl4pPr marL="1132930" indent="0">
               <a:buNone/>
               <a:defRPr sz="1200">
                 <a:solidFill>
@@ -1423,7 +1423,7 @@
                 </a:solidFill>
               </a:defRPr>
             </a:lvl4pPr>
-            <a:lvl5pPr marL="1510589" indent="0">
+            <a:lvl5pPr marL="1510573" indent="0">
               <a:buNone/>
               <a:defRPr sz="1200">
                 <a:solidFill>
@@ -1433,7 +1433,7 @@
                 </a:solidFill>
               </a:defRPr>
             </a:lvl5pPr>
-            <a:lvl6pPr marL="1888236" indent="0">
+            <a:lvl6pPr marL="1888215" indent="0">
               <a:buNone/>
               <a:defRPr sz="1200">
                 <a:solidFill>
@@ -1443,7 +1443,7 @@
                 </a:solidFill>
               </a:defRPr>
             </a:lvl6pPr>
-            <a:lvl7pPr marL="2265883" indent="0">
+            <a:lvl7pPr marL="2265858" indent="0">
               <a:buNone/>
               <a:defRPr sz="1200">
                 <a:solidFill>
@@ -1453,7 +1453,7 @@
                 </a:solidFill>
               </a:defRPr>
             </a:lvl7pPr>
-            <a:lvl8pPr marL="2643530" indent="0">
+            <a:lvl8pPr marL="2643500" indent="0">
               <a:buNone/>
               <a:defRPr sz="1200">
                 <a:solidFill>
@@ -1463,7 +1463,7 @@
                 </a:solidFill>
               </a:defRPr>
             </a:lvl8pPr>
-            <a:lvl9pPr marL="3021178" indent="0">
+            <a:lvl9pPr marL="3021144" indent="0">
               <a:buNone/>
               <a:defRPr sz="1200">
                 <a:solidFill>
@@ -1501,7 +1501,7 @@
             <a:fld id="{1D8BD707-D9CF-40AE-B4C6-C98DA3205C09}" type="datetimeFigureOut">
               <a:rPr lang="en-US" smtClean="0"/>
               <a:pPr/>
-              <a:t>8/5/2015</a:t>
+              <a:t>3/18/2018</a:t>
             </a:fld>
             <a:endParaRPr lang="en-US"/>
           </a:p>
@@ -1610,8 +1610,8 @@
         </p:nvSpPr>
         <p:spPr>
           <a:xfrm>
-            <a:off x="378063" y="604893"/>
-            <a:ext cx="3339558" cy="1710857"/>
+            <a:off x="324009" y="671940"/>
+            <a:ext cx="2862078" cy="1900486"/>
           </a:xfrm>
         </p:spPr>
         <p:txBody>
@@ -1695,8 +1695,8 @@
         </p:nvSpPr>
         <p:spPr>
           <a:xfrm>
-            <a:off x="3843642" y="604893"/>
-            <a:ext cx="3339558" cy="1710857"/>
+            <a:off x="3294090" y="671940"/>
+            <a:ext cx="2862078" cy="1900486"/>
           </a:xfrm>
         </p:spPr>
         <p:txBody>
@@ -1786,7 +1786,7 @@
             <a:fld id="{1D8BD707-D9CF-40AE-B4C6-C98DA3205C09}" type="datetimeFigureOut">
               <a:rPr lang="en-US" smtClean="0"/>
               <a:pPr/>
-              <a:t>8/5/2015</a:t>
+              <a:t>3/18/2018</a:t>
             </a:fld>
             <a:endParaRPr lang="en-US"/>
           </a:p>
@@ -1899,8 +1899,8 @@
         </p:nvSpPr>
         <p:spPr>
           <a:xfrm>
-            <a:off x="378063" y="580288"/>
-            <a:ext cx="3340871" cy="241835"/>
+            <a:off x="324010" y="644611"/>
+            <a:ext cx="2863203" cy="268639"/>
           </a:xfrm>
         </p:spPr>
         <p:txBody>
@@ -1910,37 +1910,37 @@
               <a:buNone/>
               <a:defRPr sz="2000" b="1"/>
             </a:lvl1pPr>
-            <a:lvl2pPr marL="377647" indent="0">
+            <a:lvl2pPr marL="377643" indent="0">
               <a:buNone/>
               <a:defRPr sz="1700" b="1"/>
             </a:lvl2pPr>
-            <a:lvl3pPr marL="755294" indent="0">
+            <a:lvl3pPr marL="755285" indent="0">
               <a:buNone/>
               <a:defRPr sz="1500" b="1"/>
             </a:lvl3pPr>
-            <a:lvl4pPr marL="1132942" indent="0">
-              <a:buNone/>
-              <a:defRPr sz="1300" b="1"/>
+            <a:lvl4pPr marL="1132930" indent="0">
+              <a:buNone/>
+              <a:defRPr sz="1299" b="1"/>
             </a:lvl4pPr>
-            <a:lvl5pPr marL="1510589" indent="0">
-              <a:buNone/>
-              <a:defRPr sz="1300" b="1"/>
+            <a:lvl5pPr marL="1510573" indent="0">
+              <a:buNone/>
+              <a:defRPr sz="1299" b="1"/>
             </a:lvl5pPr>
-            <a:lvl6pPr marL="1888236" indent="0">
-              <a:buNone/>
-              <a:defRPr sz="1300" b="1"/>
+            <a:lvl6pPr marL="1888215" indent="0">
+              <a:buNone/>
+              <a:defRPr sz="1299" b="1"/>
             </a:lvl6pPr>
-            <a:lvl7pPr marL="2265883" indent="0">
-              <a:buNone/>
-              <a:defRPr sz="1300" b="1"/>
+            <a:lvl7pPr marL="2265858" indent="0">
+              <a:buNone/>
+              <a:defRPr sz="1299" b="1"/>
             </a:lvl7pPr>
-            <a:lvl8pPr marL="2643530" indent="0">
-              <a:buNone/>
-              <a:defRPr sz="1300" b="1"/>
+            <a:lvl8pPr marL="2643500" indent="0">
+              <a:buNone/>
+              <a:defRPr sz="1299" b="1"/>
             </a:lvl8pPr>
-            <a:lvl9pPr marL="3021178" indent="0">
-              <a:buNone/>
-              <a:defRPr sz="1300" b="1"/>
+            <a:lvl9pPr marL="3021144" indent="0">
+              <a:buNone/>
+              <a:defRPr sz="1299" b="1"/>
             </a:lvl9pPr>
           </a:lstStyle>
           <a:p>
@@ -1964,8 +1964,8 @@
         </p:nvSpPr>
         <p:spPr>
           <a:xfrm>
-            <a:off x="378063" y="822125"/>
-            <a:ext cx="3340871" cy="1493624"/>
+            <a:off x="324010" y="913253"/>
+            <a:ext cx="2863203" cy="1659175"/>
           </a:xfrm>
         </p:spPr>
         <p:txBody>
@@ -1981,22 +1981,22 @@
               <a:defRPr sz="1500"/>
             </a:lvl3pPr>
             <a:lvl4pPr>
-              <a:defRPr sz="1300"/>
+              <a:defRPr sz="1299"/>
             </a:lvl4pPr>
             <a:lvl5pPr>
-              <a:defRPr sz="1300"/>
+              <a:defRPr sz="1299"/>
             </a:lvl5pPr>
             <a:lvl6pPr>
-              <a:defRPr sz="1300"/>
+              <a:defRPr sz="1299"/>
             </a:lvl6pPr>
             <a:lvl7pPr>
-              <a:defRPr sz="1300"/>
+              <a:defRPr sz="1299"/>
             </a:lvl7pPr>
             <a:lvl8pPr>
-              <a:defRPr sz="1300"/>
+              <a:defRPr sz="1299"/>
             </a:lvl8pPr>
             <a:lvl9pPr>
-              <a:defRPr sz="1300"/>
+              <a:defRPr sz="1299"/>
             </a:lvl9pPr>
           </a:lstStyle>
           <a:p>
@@ -2049,8 +2049,8 @@
         </p:nvSpPr>
         <p:spPr>
           <a:xfrm>
-            <a:off x="3841020" y="580288"/>
-            <a:ext cx="3342183" cy="241835"/>
+            <a:off x="3291844" y="644611"/>
+            <a:ext cx="2864327" cy="268639"/>
           </a:xfrm>
         </p:spPr>
         <p:txBody>
@@ -2060,37 +2060,37 @@
               <a:buNone/>
               <a:defRPr sz="2000" b="1"/>
             </a:lvl1pPr>
-            <a:lvl2pPr marL="377647" indent="0">
+            <a:lvl2pPr marL="377643" indent="0">
               <a:buNone/>
               <a:defRPr sz="1700" b="1"/>
             </a:lvl2pPr>
-            <a:lvl3pPr marL="755294" indent="0">
+            <a:lvl3pPr marL="755285" indent="0">
               <a:buNone/>
               <a:defRPr sz="1500" b="1"/>
             </a:lvl3pPr>
-            <a:lvl4pPr marL="1132942" indent="0">
-              <a:buNone/>
-              <a:defRPr sz="1300" b="1"/>
+            <a:lvl4pPr marL="1132930" indent="0">
+              <a:buNone/>
+              <a:defRPr sz="1299" b="1"/>
             </a:lvl4pPr>
-            <a:lvl5pPr marL="1510589" indent="0">
-              <a:buNone/>
-              <a:defRPr sz="1300" b="1"/>
+            <a:lvl5pPr marL="1510573" indent="0">
+              <a:buNone/>
+              <a:defRPr sz="1299" b="1"/>
             </a:lvl5pPr>
-            <a:lvl6pPr marL="1888236" indent="0">
-              <a:buNone/>
-              <a:defRPr sz="1300" b="1"/>
+            <a:lvl6pPr marL="1888215" indent="0">
+              <a:buNone/>
+              <a:defRPr sz="1299" b="1"/>
             </a:lvl6pPr>
-            <a:lvl7pPr marL="2265883" indent="0">
-              <a:buNone/>
-              <a:defRPr sz="1300" b="1"/>
+            <a:lvl7pPr marL="2265858" indent="0">
+              <a:buNone/>
+              <a:defRPr sz="1299" b="1"/>
             </a:lvl7pPr>
-            <a:lvl8pPr marL="2643530" indent="0">
-              <a:buNone/>
-              <a:defRPr sz="1300" b="1"/>
+            <a:lvl8pPr marL="2643500" indent="0">
+              <a:buNone/>
+              <a:defRPr sz="1299" b="1"/>
             </a:lvl8pPr>
-            <a:lvl9pPr marL="3021178" indent="0">
-              <a:buNone/>
-              <a:defRPr sz="1300" b="1"/>
+            <a:lvl9pPr marL="3021144" indent="0">
+              <a:buNone/>
+              <a:defRPr sz="1299" b="1"/>
             </a:lvl9pPr>
           </a:lstStyle>
           <a:p>
@@ -2114,8 +2114,8 @@
         </p:nvSpPr>
         <p:spPr>
           <a:xfrm>
-            <a:off x="3841020" y="822125"/>
-            <a:ext cx="3342183" cy="1493624"/>
+            <a:off x="3291844" y="913253"/>
+            <a:ext cx="2864327" cy="1659175"/>
           </a:xfrm>
         </p:spPr>
         <p:txBody>
@@ -2131,22 +2131,22 @@
               <a:defRPr sz="1500"/>
             </a:lvl3pPr>
             <a:lvl4pPr>
-              <a:defRPr sz="1300"/>
+              <a:defRPr sz="1299"/>
             </a:lvl4pPr>
             <a:lvl5pPr>
-              <a:defRPr sz="1300"/>
+              <a:defRPr sz="1299"/>
             </a:lvl5pPr>
             <a:lvl6pPr>
-              <a:defRPr sz="1300"/>
+              <a:defRPr sz="1299"/>
             </a:lvl6pPr>
             <a:lvl7pPr>
-              <a:defRPr sz="1300"/>
+              <a:defRPr sz="1299"/>
             </a:lvl7pPr>
             <a:lvl8pPr>
-              <a:defRPr sz="1300"/>
+              <a:defRPr sz="1299"/>
             </a:lvl8pPr>
             <a:lvl9pPr>
-              <a:defRPr sz="1300"/>
+              <a:defRPr sz="1299"/>
             </a:lvl9pPr>
           </a:lstStyle>
           <a:p>
@@ -2205,7 +2205,7 @@
             <a:fld id="{1D8BD707-D9CF-40AE-B4C6-C98DA3205C09}" type="datetimeFigureOut">
               <a:rPr lang="en-US" smtClean="0"/>
               <a:pPr/>
-              <a:t>8/5/2015</a:t>
+              <a:t>3/18/2018</a:t>
             </a:fld>
             <a:endParaRPr lang="en-US"/>
           </a:p>
@@ -2320,7 +2320,7 @@
             <a:fld id="{1D8BD707-D9CF-40AE-B4C6-C98DA3205C09}" type="datetimeFigureOut">
               <a:rPr lang="en-US" smtClean="0"/>
               <a:pPr/>
-              <a:t>8/5/2015</a:t>
+              <a:t>3/18/2018</a:t>
             </a:fld>
             <a:endParaRPr lang="en-US"/>
           </a:p>
@@ -2412,7 +2412,7 @@
             <a:fld id="{1D8BD707-D9CF-40AE-B4C6-C98DA3205C09}" type="datetimeFigureOut">
               <a:rPr lang="en-US" smtClean="0"/>
               <a:pPr/>
-              <a:t>8/5/2015</a:t>
+              <a:t>3/18/2018</a:t>
             </a:fld>
             <a:endParaRPr lang="en-US"/>
           </a:p>
@@ -2498,8 +2498,8 @@
         </p:nvSpPr>
         <p:spPr>
           <a:xfrm>
-            <a:off x="378066" y="103217"/>
-            <a:ext cx="2487604" cy="439265"/>
+            <a:off x="324012" y="114660"/>
+            <a:ext cx="2131934" cy="487953"/>
           </a:xfrm>
         </p:spPr>
         <p:txBody>
@@ -2530,8 +2530,8 @@
         </p:nvSpPr>
         <p:spPr>
           <a:xfrm>
-            <a:off x="2956244" y="103217"/>
-            <a:ext cx="4226956" cy="2212531"/>
+            <a:off x="2533570" y="114662"/>
+            <a:ext cx="3622598" cy="2457765"/>
           </a:xfrm>
         </p:spPr>
         <p:txBody>
@@ -2615,8 +2615,8 @@
         </p:nvSpPr>
         <p:spPr>
           <a:xfrm>
-            <a:off x="378066" y="542483"/>
-            <a:ext cx="2487604" cy="1773265"/>
+            <a:off x="324012" y="602611"/>
+            <a:ext cx="2131934" cy="1969812"/>
           </a:xfrm>
         </p:spPr>
         <p:txBody>
@@ -2626,35 +2626,35 @@
               <a:buNone/>
               <a:defRPr sz="1200"/>
             </a:lvl1pPr>
-            <a:lvl2pPr marL="377647" indent="0">
+            <a:lvl2pPr marL="377643" indent="0">
               <a:buNone/>
               <a:defRPr sz="1000"/>
             </a:lvl2pPr>
-            <a:lvl3pPr marL="755294" indent="0">
+            <a:lvl3pPr marL="755285" indent="0">
               <a:buNone/>
               <a:defRPr sz="800"/>
             </a:lvl3pPr>
-            <a:lvl4pPr marL="1132942" indent="0">
+            <a:lvl4pPr marL="1132930" indent="0">
               <a:buNone/>
               <a:defRPr sz="700"/>
             </a:lvl4pPr>
-            <a:lvl5pPr marL="1510589" indent="0">
+            <a:lvl5pPr marL="1510573" indent="0">
               <a:buNone/>
               <a:defRPr sz="700"/>
             </a:lvl5pPr>
-            <a:lvl6pPr marL="1888236" indent="0">
+            <a:lvl6pPr marL="1888215" indent="0">
               <a:buNone/>
               <a:defRPr sz="700"/>
             </a:lvl6pPr>
-            <a:lvl7pPr marL="2265883" indent="0">
+            <a:lvl7pPr marL="2265858" indent="0">
               <a:buNone/>
               <a:defRPr sz="700"/>
             </a:lvl7pPr>
-            <a:lvl8pPr marL="2643530" indent="0">
+            <a:lvl8pPr marL="2643500" indent="0">
               <a:buNone/>
               <a:defRPr sz="700"/>
             </a:lvl8pPr>
-            <a:lvl9pPr marL="3021178" indent="0">
+            <a:lvl9pPr marL="3021144" indent="0">
               <a:buNone/>
               <a:defRPr sz="700"/>
             </a:lvl9pPr>
@@ -2686,7 +2686,7 @@
             <a:fld id="{1D8BD707-D9CF-40AE-B4C6-C98DA3205C09}" type="datetimeFigureOut">
               <a:rPr lang="en-US" smtClean="0"/>
               <a:pPr/>
-              <a:t>8/5/2015</a:t>
+              <a:t>3/18/2018</a:t>
             </a:fld>
             <a:endParaRPr lang="en-US"/>
           </a:p>
@@ -2772,8 +2772,8 @@
         </p:nvSpPr>
         <p:spPr>
           <a:xfrm>
-            <a:off x="1482061" y="1814675"/>
-            <a:ext cx="4536758" cy="214232"/>
+            <a:off x="1270163" y="2015816"/>
+            <a:ext cx="3888105" cy="237977"/>
           </a:xfrm>
         </p:spPr>
         <p:txBody>
@@ -2804,8 +2804,8 @@
         </p:nvSpPr>
         <p:spPr>
           <a:xfrm>
-            <a:off x="1482061" y="231637"/>
-            <a:ext cx="4536758" cy="1555433"/>
+            <a:off x="1270163" y="257316"/>
+            <a:ext cx="3888105" cy="1727835"/>
           </a:xfrm>
         </p:spPr>
         <p:txBody>
@@ -2815,35 +2815,35 @@
               <a:buNone/>
               <a:defRPr sz="2600"/>
             </a:lvl1pPr>
-            <a:lvl2pPr marL="377647" indent="0">
+            <a:lvl2pPr marL="377643" indent="0">
               <a:buNone/>
               <a:defRPr sz="2300"/>
             </a:lvl2pPr>
-            <a:lvl3pPr marL="755294" indent="0">
+            <a:lvl3pPr marL="755285" indent="0">
               <a:buNone/>
               <a:defRPr sz="2000"/>
             </a:lvl3pPr>
-            <a:lvl4pPr marL="1132942" indent="0">
+            <a:lvl4pPr marL="1132930" indent="0">
               <a:buNone/>
               <a:defRPr sz="1700"/>
             </a:lvl4pPr>
-            <a:lvl5pPr marL="1510589" indent="0">
+            <a:lvl5pPr marL="1510573" indent="0">
               <a:buNone/>
               <a:defRPr sz="1700"/>
             </a:lvl5pPr>
-            <a:lvl6pPr marL="1888236" indent="0">
+            <a:lvl6pPr marL="1888215" indent="0">
               <a:buNone/>
               <a:defRPr sz="1700"/>
             </a:lvl6pPr>
-            <a:lvl7pPr marL="2265883" indent="0">
+            <a:lvl7pPr marL="2265858" indent="0">
               <a:buNone/>
               <a:defRPr sz="1700"/>
             </a:lvl7pPr>
-            <a:lvl8pPr marL="2643530" indent="0">
+            <a:lvl8pPr marL="2643500" indent="0">
               <a:buNone/>
               <a:defRPr sz="1700"/>
             </a:lvl8pPr>
-            <a:lvl9pPr marL="3021178" indent="0">
+            <a:lvl9pPr marL="3021144" indent="0">
               <a:buNone/>
               <a:defRPr sz="1700"/>
             </a:lvl9pPr>
@@ -2865,8 +2865,8 @@
         </p:nvSpPr>
         <p:spPr>
           <a:xfrm>
-            <a:off x="1482061" y="2028904"/>
-            <a:ext cx="4536758" cy="304245"/>
+            <a:off x="1270163" y="2253787"/>
+            <a:ext cx="3888105" cy="337968"/>
           </a:xfrm>
         </p:spPr>
         <p:txBody>
@@ -2876,35 +2876,35 @@
               <a:buNone/>
               <a:defRPr sz="1200"/>
             </a:lvl1pPr>
-            <a:lvl2pPr marL="377647" indent="0">
+            <a:lvl2pPr marL="377643" indent="0">
               <a:buNone/>
               <a:defRPr sz="1000"/>
             </a:lvl2pPr>
-            <a:lvl3pPr marL="755294" indent="0">
+            <a:lvl3pPr marL="755285" indent="0">
               <a:buNone/>
               <a:defRPr sz="800"/>
             </a:lvl3pPr>
-            <a:lvl4pPr marL="1132942" indent="0">
+            <a:lvl4pPr marL="1132930" indent="0">
               <a:buNone/>
               <a:defRPr sz="700"/>
             </a:lvl4pPr>
-            <a:lvl5pPr marL="1510589" indent="0">
+            <a:lvl5pPr marL="1510573" indent="0">
               <a:buNone/>
               <a:defRPr sz="700"/>
             </a:lvl5pPr>
-            <a:lvl6pPr marL="1888236" indent="0">
+            <a:lvl6pPr marL="1888215" indent="0">
               <a:buNone/>
               <a:defRPr sz="700"/>
             </a:lvl6pPr>
-            <a:lvl7pPr marL="2265883" indent="0">
+            <a:lvl7pPr marL="2265858" indent="0">
               <a:buNone/>
               <a:defRPr sz="700"/>
             </a:lvl7pPr>
-            <a:lvl8pPr marL="2643530" indent="0">
+            <a:lvl8pPr marL="2643500" indent="0">
               <a:buNone/>
               <a:defRPr sz="700"/>
             </a:lvl8pPr>
-            <a:lvl9pPr marL="3021178" indent="0">
+            <a:lvl9pPr marL="3021144" indent="0">
               <a:buNone/>
               <a:defRPr sz="700"/>
             </a:lvl9pPr>
@@ -2936,7 +2936,7 @@
             <a:fld id="{1D8BD707-D9CF-40AE-B4C6-C98DA3205C09}" type="datetimeFigureOut">
               <a:rPr lang="en-US" smtClean="0"/>
               <a:pPr/>
-              <a:t>8/5/2015</a:t>
+              <a:t>3/18/2018</a:t>
             </a:fld>
             <a:endParaRPr lang="en-US"/>
           </a:p>
@@ -3027,8 +3027,8 @@
         </p:nvSpPr>
         <p:spPr>
           <a:xfrm>
-            <a:off x="378066" y="103819"/>
-            <a:ext cx="6805137" cy="432065"/>
+            <a:off x="324014" y="115329"/>
+            <a:ext cx="5832158" cy="479954"/>
           </a:xfrm>
           <a:prstGeom prst="rect">
             <a:avLst/>
@@ -3060,8 +3060,8 @@
         </p:nvSpPr>
         <p:spPr>
           <a:xfrm>
-            <a:off x="378066" y="604893"/>
-            <a:ext cx="6805137" cy="1710857"/>
+            <a:off x="324014" y="671940"/>
+            <a:ext cx="5832158" cy="1900486"/>
           </a:xfrm>
           <a:prstGeom prst="rect">
             <a:avLst/>
@@ -3122,8 +3122,8 @@
         </p:nvSpPr>
         <p:spPr>
           <a:xfrm>
-            <a:off x="378065" y="2402761"/>
-            <a:ext cx="1764295" cy="138021"/>
+            <a:off x="324015" y="2669085"/>
+            <a:ext cx="1512041" cy="153319"/>
           </a:xfrm>
           <a:prstGeom prst="rect">
             <a:avLst/>
@@ -3146,7 +3146,7 @@
             <a:fld id="{1D8BD707-D9CF-40AE-B4C6-C98DA3205C09}" type="datetimeFigureOut">
               <a:rPr lang="en-US" smtClean="0"/>
               <a:pPr/>
-              <a:t>8/5/2015</a:t>
+              <a:t>3/18/2018</a:t>
             </a:fld>
             <a:endParaRPr lang="en-US"/>
           </a:p>
@@ -3164,8 +3164,8 @@
         </p:nvSpPr>
         <p:spPr>
           <a:xfrm>
-            <a:off x="2583433" y="2402761"/>
-            <a:ext cx="2394400" cy="138021"/>
+            <a:off x="2214063" y="2669085"/>
+            <a:ext cx="2052056" cy="153319"/>
           </a:xfrm>
           <a:prstGeom prst="rect">
             <a:avLst/>
@@ -3201,8 +3201,8 @@
         </p:nvSpPr>
         <p:spPr>
           <a:xfrm>
-            <a:off x="5418908" y="2402761"/>
-            <a:ext cx="1764295" cy="138021"/>
+            <a:off x="4644131" y="2669085"/>
+            <a:ext cx="1512041" cy="153319"/>
           </a:xfrm>
           <a:prstGeom prst="rect">
             <a:avLst/>
@@ -3249,7 +3249,7 @@
   </p:sldLayoutIdLst>
   <p:txStyles>
     <p:titleStyle>
-      <a:lvl1pPr algn="ctr" defTabSz="755294" rtl="0" eaLnBrk="1" latinLnBrk="0" hangingPunct="1">
+      <a:lvl1pPr algn="ctr" defTabSz="755285" rtl="0" eaLnBrk="1" latinLnBrk="0" hangingPunct="1">
         <a:spcBef>
           <a:spcPct val="0"/>
         </a:spcBef>
@@ -3265,7 +3265,7 @@
       </a:lvl1pPr>
     </p:titleStyle>
     <p:bodyStyle>
-      <a:lvl1pPr marL="283235" indent="-283235" algn="l" defTabSz="755294" rtl="0" eaLnBrk="1" latinLnBrk="0" hangingPunct="1">
+      <a:lvl1pPr marL="283232" indent="-283232" algn="l" defTabSz="755285" rtl="0" eaLnBrk="1" latinLnBrk="0" hangingPunct="1">
         <a:spcBef>
           <a:spcPct val="20000"/>
         </a:spcBef>
@@ -3280,7 +3280,7 @@
           <a:cs typeface="+mn-cs"/>
         </a:defRPr>
       </a:lvl1pPr>
-      <a:lvl2pPr marL="613677" indent="-236030" algn="l" defTabSz="755294" rtl="0" eaLnBrk="1" latinLnBrk="0" hangingPunct="1">
+      <a:lvl2pPr marL="613670" indent="-236027" algn="l" defTabSz="755285" rtl="0" eaLnBrk="1" latinLnBrk="0" hangingPunct="1">
         <a:spcBef>
           <a:spcPct val="20000"/>
         </a:spcBef>
@@ -3295,7 +3295,7 @@
           <a:cs typeface="+mn-cs"/>
         </a:defRPr>
       </a:lvl2pPr>
-      <a:lvl3pPr marL="944118" indent="-188824" algn="l" defTabSz="755294" rtl="0" eaLnBrk="1" latinLnBrk="0" hangingPunct="1">
+      <a:lvl3pPr marL="944107" indent="-188822" algn="l" defTabSz="755285" rtl="0" eaLnBrk="1" latinLnBrk="0" hangingPunct="1">
         <a:spcBef>
           <a:spcPct val="20000"/>
         </a:spcBef>
@@ -3310,7 +3310,7 @@
           <a:cs typeface="+mn-cs"/>
         </a:defRPr>
       </a:lvl3pPr>
-      <a:lvl4pPr marL="1321765" indent="-188824" algn="l" defTabSz="755294" rtl="0" eaLnBrk="1" latinLnBrk="0" hangingPunct="1">
+      <a:lvl4pPr marL="1321751" indent="-188822" algn="l" defTabSz="755285" rtl="0" eaLnBrk="1" latinLnBrk="0" hangingPunct="1">
         <a:spcBef>
           <a:spcPct val="20000"/>
         </a:spcBef>
@@ -3325,7 +3325,7 @@
           <a:cs typeface="+mn-cs"/>
         </a:defRPr>
       </a:lvl4pPr>
-      <a:lvl5pPr marL="1699412" indent="-188824" algn="l" defTabSz="755294" rtl="0" eaLnBrk="1" latinLnBrk="0" hangingPunct="1">
+      <a:lvl5pPr marL="1699393" indent="-188822" algn="l" defTabSz="755285" rtl="0" eaLnBrk="1" latinLnBrk="0" hangingPunct="1">
         <a:spcBef>
           <a:spcPct val="20000"/>
         </a:spcBef>
@@ -3340,7 +3340,7 @@
           <a:cs typeface="+mn-cs"/>
         </a:defRPr>
       </a:lvl5pPr>
-      <a:lvl6pPr marL="2077060" indent="-188824" algn="l" defTabSz="755294" rtl="0" eaLnBrk="1" latinLnBrk="0" hangingPunct="1">
+      <a:lvl6pPr marL="2077037" indent="-188822" algn="l" defTabSz="755285" rtl="0" eaLnBrk="1" latinLnBrk="0" hangingPunct="1">
         <a:spcBef>
           <a:spcPct val="20000"/>
         </a:spcBef>
@@ -3355,7 +3355,7 @@
           <a:cs typeface="+mn-cs"/>
         </a:defRPr>
       </a:lvl6pPr>
-      <a:lvl7pPr marL="2454707" indent="-188824" algn="l" defTabSz="755294" rtl="0" eaLnBrk="1" latinLnBrk="0" hangingPunct="1">
+      <a:lvl7pPr marL="2454680" indent="-188822" algn="l" defTabSz="755285" rtl="0" eaLnBrk="1" latinLnBrk="0" hangingPunct="1">
         <a:spcBef>
           <a:spcPct val="20000"/>
         </a:spcBef>
@@ -3370,7 +3370,7 @@
           <a:cs typeface="+mn-cs"/>
         </a:defRPr>
       </a:lvl7pPr>
-      <a:lvl8pPr marL="2832354" indent="-188824" algn="l" defTabSz="755294" rtl="0" eaLnBrk="1" latinLnBrk="0" hangingPunct="1">
+      <a:lvl8pPr marL="2832322" indent="-188822" algn="l" defTabSz="755285" rtl="0" eaLnBrk="1" latinLnBrk="0" hangingPunct="1">
         <a:spcBef>
           <a:spcPct val="20000"/>
         </a:spcBef>
@@ -3385,7 +3385,7 @@
           <a:cs typeface="+mn-cs"/>
         </a:defRPr>
       </a:lvl8pPr>
-      <a:lvl9pPr marL="3210001" indent="-188824" algn="l" defTabSz="755294" rtl="0" eaLnBrk="1" latinLnBrk="0" hangingPunct="1">
+      <a:lvl9pPr marL="3209965" indent="-188822" algn="l" defTabSz="755285" rtl="0" eaLnBrk="1" latinLnBrk="0" hangingPunct="1">
         <a:spcBef>
           <a:spcPct val="20000"/>
         </a:spcBef>
@@ -3405,7 +3405,7 @@
       <a:defPPr>
         <a:defRPr lang="en-US"/>
       </a:defPPr>
-      <a:lvl1pPr marL="0" algn="l" defTabSz="755294" rtl="0" eaLnBrk="1" latinLnBrk="0" hangingPunct="1">
+      <a:lvl1pPr marL="0" algn="l" defTabSz="755285" rtl="0" eaLnBrk="1" latinLnBrk="0" hangingPunct="1">
         <a:defRPr sz="1500" kern="1200">
           <a:solidFill>
             <a:schemeClr val="tx1"/>
@@ -3415,7 +3415,7 @@
           <a:cs typeface="+mn-cs"/>
         </a:defRPr>
       </a:lvl1pPr>
-      <a:lvl2pPr marL="377647" algn="l" defTabSz="755294" rtl="0" eaLnBrk="1" latinLnBrk="0" hangingPunct="1">
+      <a:lvl2pPr marL="377643" algn="l" defTabSz="755285" rtl="0" eaLnBrk="1" latinLnBrk="0" hangingPunct="1">
         <a:defRPr sz="1500" kern="1200">
           <a:solidFill>
             <a:schemeClr val="tx1"/>
@@ -3425,7 +3425,7 @@
           <a:cs typeface="+mn-cs"/>
         </a:defRPr>
       </a:lvl2pPr>
-      <a:lvl3pPr marL="755294" algn="l" defTabSz="755294" rtl="0" eaLnBrk="1" latinLnBrk="0" hangingPunct="1">
+      <a:lvl3pPr marL="755285" algn="l" defTabSz="755285" rtl="0" eaLnBrk="1" latinLnBrk="0" hangingPunct="1">
         <a:defRPr sz="1500" kern="1200">
           <a:solidFill>
             <a:schemeClr val="tx1"/>
@@ -3435,7 +3435,7 @@
           <a:cs typeface="+mn-cs"/>
         </a:defRPr>
       </a:lvl3pPr>
-      <a:lvl4pPr marL="1132942" algn="l" defTabSz="755294" rtl="0" eaLnBrk="1" latinLnBrk="0" hangingPunct="1">
+      <a:lvl4pPr marL="1132930" algn="l" defTabSz="755285" rtl="0" eaLnBrk="1" latinLnBrk="0" hangingPunct="1">
         <a:defRPr sz="1500" kern="1200">
           <a:solidFill>
             <a:schemeClr val="tx1"/>
@@ -3445,7 +3445,7 @@
           <a:cs typeface="+mn-cs"/>
         </a:defRPr>
       </a:lvl4pPr>
-      <a:lvl5pPr marL="1510589" algn="l" defTabSz="755294" rtl="0" eaLnBrk="1" latinLnBrk="0" hangingPunct="1">
+      <a:lvl5pPr marL="1510573" algn="l" defTabSz="755285" rtl="0" eaLnBrk="1" latinLnBrk="0" hangingPunct="1">
         <a:defRPr sz="1500" kern="1200">
           <a:solidFill>
             <a:schemeClr val="tx1"/>
@@ -3455,7 +3455,7 @@
           <a:cs typeface="+mn-cs"/>
         </a:defRPr>
       </a:lvl5pPr>
-      <a:lvl6pPr marL="1888236" algn="l" defTabSz="755294" rtl="0" eaLnBrk="1" latinLnBrk="0" hangingPunct="1">
+      <a:lvl6pPr marL="1888215" algn="l" defTabSz="755285" rtl="0" eaLnBrk="1" latinLnBrk="0" hangingPunct="1">
         <a:defRPr sz="1500" kern="1200">
           <a:solidFill>
             <a:schemeClr val="tx1"/>
@@ -3465,7 +3465,7 @@
           <a:cs typeface="+mn-cs"/>
         </a:defRPr>
       </a:lvl6pPr>
-      <a:lvl7pPr marL="2265883" algn="l" defTabSz="755294" rtl="0" eaLnBrk="1" latinLnBrk="0" hangingPunct="1">
+      <a:lvl7pPr marL="2265858" algn="l" defTabSz="755285" rtl="0" eaLnBrk="1" latinLnBrk="0" hangingPunct="1">
         <a:defRPr sz="1500" kern="1200">
           <a:solidFill>
             <a:schemeClr val="tx1"/>
@@ -3475,7 +3475,7 @@
           <a:cs typeface="+mn-cs"/>
         </a:defRPr>
       </a:lvl7pPr>
-      <a:lvl8pPr marL="2643530" algn="l" defTabSz="755294" rtl="0" eaLnBrk="1" latinLnBrk="0" hangingPunct="1">
+      <a:lvl8pPr marL="2643500" algn="l" defTabSz="755285" rtl="0" eaLnBrk="1" latinLnBrk="0" hangingPunct="1">
         <a:defRPr sz="1500" kern="1200">
           <a:solidFill>
             <a:schemeClr val="tx1"/>
@@ -3485,7 +3485,7 @@
           <a:cs typeface="+mn-cs"/>
         </a:defRPr>
       </a:lvl8pPr>
-      <a:lvl9pPr marL="3021178" algn="l" defTabSz="755294" rtl="0" eaLnBrk="1" latinLnBrk="0" hangingPunct="1">
+      <a:lvl9pPr marL="3021144" algn="l" defTabSz="755285" rtl="0" eaLnBrk="1" latinLnBrk="0" hangingPunct="1">
         <a:defRPr sz="1500" kern="1200">
           <a:solidFill>
             <a:schemeClr val="tx1"/>
@@ -3525,28 +3525,63 @@
         </p:nvSpPr>
         <p:spPr>
           <a:xfrm>
-            <a:off x="6324599" y="39855"/>
-            <a:ext cx="1066799" cy="2510157"/>
+            <a:off x="3926271" y="107260"/>
+            <a:ext cx="1144800" cy="2628000"/>
           </a:xfrm>
           <a:prstGeom prst="roundRect">
             <a:avLst>
-              <a:gd name="adj" fmla="val 9190"/>
+              <a:gd name="adj" fmla="val 5446"/>
             </a:avLst>
           </a:prstGeom>
-          <a:solidFill>
-            <a:schemeClr val="accent3">
-              <a:lumMod val="40000"/>
-              <a:lumOff val="60000"/>
+          <a:ln/>
+        </p:spPr>
+        <p:style>
+          <a:lnRef idx="2">
+            <a:schemeClr val="accent4">
+              <a:shade val="50000"/>
             </a:schemeClr>
-          </a:solidFill>
-          <a:ln>
-            <a:solidFill>
-              <a:schemeClr val="accent3">
-                <a:lumMod val="40000"/>
-                <a:lumOff val="60000"/>
-              </a:schemeClr>
-            </a:solidFill>
-          </a:ln>
+          </a:lnRef>
+          <a:fillRef idx="1">
+            <a:schemeClr val="accent4"/>
+          </a:fillRef>
+          <a:effectRef idx="0">
+            <a:schemeClr val="accent4"/>
+          </a:effectRef>
+          <a:fontRef idx="minor">
+            <a:schemeClr val="lt1"/>
+          </a:fontRef>
+        </p:style>
+        <p:txBody>
+          <a:bodyPr rtlCol="0" anchor="b" anchorCtr="0"/>
+          <a:lstStyle/>
+          <a:p>
+            <a:endParaRPr lang="en-SG" sz="1400" b="1" dirty="0">
+              <a:solidFill>
+                <a:schemeClr val="tx1"/>
+              </a:solidFill>
+              <a:latin typeface="Consolas" pitchFamily="49" charset="0"/>
+              <a:cs typeface="Consolas" pitchFamily="49" charset="0"/>
+            </a:endParaRPr>
+          </a:p>
+        </p:txBody>
+      </p:sp>
+      <p:sp>
+        <p:nvSpPr>
+          <p:cNvPr id="154" name="Rounded Rectangle 153"/>
+          <p:cNvSpPr/>
+          <p:nvPr/>
+        </p:nvSpPr>
+        <p:spPr>
+          <a:xfrm>
+            <a:off x="2668396" y="107260"/>
+            <a:ext cx="1144800" cy="2628000"/>
+          </a:xfrm>
+          <a:prstGeom prst="roundRect">
+            <a:avLst>
+              <a:gd name="adj" fmla="val 4447"/>
+            </a:avLst>
+          </a:prstGeom>
+          <a:ln/>
         </p:spPr>
         <p:style>
           <a:lnRef idx="2">
@@ -3568,6 +3603,54 @@
           <a:bodyPr rtlCol="0" anchor="b" anchorCtr="0"/>
           <a:lstStyle/>
           <a:p>
+            <a:endParaRPr lang="en-SG" sz="1400" dirty="0">
+              <a:solidFill>
+                <a:schemeClr val="tx1"/>
+              </a:solidFill>
+              <a:latin typeface="Consolas" pitchFamily="49" charset="0"/>
+              <a:cs typeface="Consolas" pitchFamily="49" charset="0"/>
+            </a:endParaRPr>
+          </a:p>
+        </p:txBody>
+      </p:sp>
+      <p:sp>
+        <p:nvSpPr>
+          <p:cNvPr id="155" name="Rounded Rectangle 154"/>
+          <p:cNvSpPr/>
+          <p:nvPr/>
+        </p:nvSpPr>
+        <p:spPr>
+          <a:xfrm>
+            <a:off x="1410520" y="107260"/>
+            <a:ext cx="1144800" cy="2628000"/>
+          </a:xfrm>
+          <a:prstGeom prst="roundRect">
+            <a:avLst>
+              <a:gd name="adj" fmla="val 3720"/>
+            </a:avLst>
+          </a:prstGeom>
+          <a:ln/>
+        </p:spPr>
+        <p:style>
+          <a:lnRef idx="2">
+            <a:schemeClr val="accent3">
+              <a:shade val="50000"/>
+            </a:schemeClr>
+          </a:lnRef>
+          <a:fillRef idx="1">
+            <a:schemeClr val="accent3"/>
+          </a:fillRef>
+          <a:effectRef idx="0">
+            <a:schemeClr val="accent3"/>
+          </a:effectRef>
+          <a:fontRef idx="minor">
+            <a:schemeClr val="lt1"/>
+          </a:fontRef>
+        </p:style>
+        <p:txBody>
+          <a:bodyPr vert="horz" rtlCol="0" anchor="b" anchorCtr="0"/>
+          <a:lstStyle/>
+          <a:p>
             <a:endParaRPr lang="en-SG" sz="1400" b="1" dirty="0">
               <a:solidFill>
                 <a:schemeClr val="tx1"/>
@@ -3580,46 +3663,33 @@
       </p:sp>
       <p:sp>
         <p:nvSpPr>
-          <p:cNvPr id="154" name="Rounded Rectangle 153"/>
+          <p:cNvPr id="156" name="Rounded Rectangle 155"/>
           <p:cNvSpPr/>
           <p:nvPr/>
         </p:nvSpPr>
         <p:spPr>
           <a:xfrm>
-            <a:off x="3899262" y="39855"/>
-            <a:ext cx="2320654" cy="2510157"/>
+            <a:off x="146698" y="107260"/>
+            <a:ext cx="1144800" cy="2628000"/>
           </a:xfrm>
           <a:prstGeom prst="roundRect">
             <a:avLst>
-              <a:gd name="adj" fmla="val 4405"/>
+              <a:gd name="adj" fmla="val 2950"/>
             </a:avLst>
           </a:prstGeom>
-          <a:solidFill>
-            <a:schemeClr val="accent4">
-              <a:lumMod val="40000"/>
-              <a:lumOff val="60000"/>
-            </a:schemeClr>
-          </a:solidFill>
-          <a:ln>
-            <a:solidFill>
-              <a:schemeClr val="accent4">
-                <a:lumMod val="40000"/>
-                <a:lumOff val="60000"/>
-              </a:schemeClr>
-            </a:solidFill>
-          </a:ln>
+          <a:ln/>
         </p:spPr>
         <p:style>
           <a:lnRef idx="2">
-            <a:schemeClr val="accent1">
+            <a:schemeClr val="accent5">
               <a:shade val="50000"/>
             </a:schemeClr>
           </a:lnRef>
           <a:fillRef idx="1">
-            <a:schemeClr val="accent1"/>
+            <a:schemeClr val="accent5"/>
           </a:fillRef>
           <a:effectRef idx="0">
-            <a:schemeClr val="accent1"/>
+            <a:schemeClr val="accent5"/>
           </a:effectRef>
           <a:fontRef idx="minor">
             <a:schemeClr val="lt1"/>
@@ -3629,7 +3699,7 @@
           <a:bodyPr rtlCol="0" anchor="b" anchorCtr="0"/>
           <a:lstStyle/>
           <a:p>
-            <a:endParaRPr lang="en-SG" sz="1400" dirty="0">
+            <a:endParaRPr lang="en-US" sz="1400" b="1" dirty="0">
               <a:solidFill>
                 <a:schemeClr val="tx1"/>
               </a:solidFill>
@@ -3641,198 +3711,14 @@
       </p:sp>
       <p:sp>
         <p:nvSpPr>
-          <p:cNvPr id="155" name="Rounded Rectangle 154"/>
-          <p:cNvSpPr/>
-          <p:nvPr/>
-        </p:nvSpPr>
-        <p:spPr>
-          <a:xfrm>
-            <a:off x="2757508" y="39698"/>
-            <a:ext cx="1044850" cy="2510287"/>
-          </a:xfrm>
-          <a:prstGeom prst="roundRect">
-            <a:avLst>
-              <a:gd name="adj" fmla="val 9190"/>
-            </a:avLst>
-          </a:prstGeom>
-          <a:solidFill>
-            <a:schemeClr val="accent5">
-              <a:lumMod val="40000"/>
-              <a:lumOff val="60000"/>
-            </a:schemeClr>
-          </a:solidFill>
-          <a:ln>
-            <a:solidFill>
-              <a:schemeClr val="accent5">
-                <a:lumMod val="40000"/>
-                <a:lumOff val="60000"/>
-              </a:schemeClr>
-            </a:solidFill>
-          </a:ln>
-        </p:spPr>
-        <p:style>
-          <a:lnRef idx="2">
-            <a:schemeClr val="accent1">
-              <a:shade val="50000"/>
-            </a:schemeClr>
-          </a:lnRef>
-          <a:fillRef idx="1">
-            <a:schemeClr val="accent1"/>
-          </a:fillRef>
-          <a:effectRef idx="0">
-            <a:schemeClr val="accent1"/>
-          </a:effectRef>
-          <a:fontRef idx="minor">
-            <a:schemeClr val="lt1"/>
-          </a:fontRef>
-        </p:style>
-        <p:txBody>
-          <a:bodyPr vert="horz" rtlCol="0" anchor="b" anchorCtr="0"/>
-          <a:lstStyle/>
-          <a:p>
-            <a:endParaRPr lang="en-SG" sz="1400" b="1" dirty="0">
-              <a:solidFill>
-                <a:schemeClr val="tx1"/>
-              </a:solidFill>
-              <a:latin typeface="Consolas" pitchFamily="49" charset="0"/>
-              <a:cs typeface="Consolas" pitchFamily="49" charset="0"/>
-            </a:endParaRPr>
-          </a:p>
-        </p:txBody>
-      </p:sp>
-      <p:sp>
-        <p:nvSpPr>
-          <p:cNvPr id="156" name="Rounded Rectangle 155"/>
-          <p:cNvSpPr/>
-          <p:nvPr/>
-        </p:nvSpPr>
-        <p:spPr>
-          <a:xfrm>
-            <a:off x="1412367" y="39698"/>
-            <a:ext cx="1248102" cy="2510287"/>
-          </a:xfrm>
-          <a:prstGeom prst="roundRect">
-            <a:avLst>
-              <a:gd name="adj" fmla="val 9190"/>
-            </a:avLst>
-          </a:prstGeom>
-          <a:solidFill>
-            <a:schemeClr val="accent1">
-              <a:lumMod val="40000"/>
-              <a:lumOff val="60000"/>
-            </a:schemeClr>
-          </a:solidFill>
-          <a:ln>
-            <a:solidFill>
-              <a:schemeClr val="accent1">
-                <a:lumMod val="40000"/>
-                <a:lumOff val="60000"/>
-              </a:schemeClr>
-            </a:solidFill>
-          </a:ln>
-        </p:spPr>
-        <p:style>
-          <a:lnRef idx="2">
-            <a:schemeClr val="accent1">
-              <a:shade val="50000"/>
-            </a:schemeClr>
-          </a:lnRef>
-          <a:fillRef idx="1">
-            <a:schemeClr val="accent1"/>
-          </a:fillRef>
-          <a:effectRef idx="0">
-            <a:schemeClr val="accent1"/>
-          </a:effectRef>
-          <a:fontRef idx="minor">
-            <a:schemeClr val="lt1"/>
-          </a:fontRef>
-        </p:style>
-        <p:txBody>
-          <a:bodyPr rtlCol="0" anchor="b" anchorCtr="0"/>
-          <a:lstStyle/>
-          <a:p>
-            <a:endParaRPr lang="en-US" sz="1400" b="1" dirty="0" smtClean="0">
-              <a:solidFill>
-                <a:schemeClr val="tx1"/>
-              </a:solidFill>
-              <a:latin typeface="Consolas" pitchFamily="49" charset="0"/>
-              <a:cs typeface="Consolas" pitchFamily="49" charset="0"/>
-            </a:endParaRPr>
-          </a:p>
-        </p:txBody>
-      </p:sp>
-      <p:sp>
-        <p:nvSpPr>
-          <p:cNvPr id="157" name="Rounded Rectangle 156"/>
-          <p:cNvSpPr/>
-          <p:nvPr/>
-        </p:nvSpPr>
-        <p:spPr>
-          <a:xfrm>
-            <a:off x="152401" y="39699"/>
-            <a:ext cx="1142999" cy="2510287"/>
-          </a:xfrm>
-          <a:prstGeom prst="roundRect">
-            <a:avLst>
-              <a:gd name="adj" fmla="val 9190"/>
-            </a:avLst>
-          </a:prstGeom>
-          <a:solidFill>
-            <a:schemeClr val="accent2">
-              <a:lumMod val="40000"/>
-              <a:lumOff val="60000"/>
-            </a:schemeClr>
-          </a:solidFill>
-          <a:ln>
-            <a:solidFill>
-              <a:schemeClr val="accent2">
-                <a:lumMod val="40000"/>
-                <a:lumOff val="60000"/>
-              </a:schemeClr>
-            </a:solidFill>
-          </a:ln>
-        </p:spPr>
-        <p:style>
-          <a:lnRef idx="2">
-            <a:schemeClr val="accent1">
-              <a:shade val="50000"/>
-            </a:schemeClr>
-          </a:lnRef>
-          <a:fillRef idx="1">
-            <a:schemeClr val="accent1"/>
-          </a:fillRef>
-          <a:effectRef idx="0">
-            <a:schemeClr val="accent1"/>
-          </a:effectRef>
-          <a:fontRef idx="minor">
-            <a:schemeClr val="lt1"/>
-          </a:fontRef>
-        </p:style>
-        <p:txBody>
-          <a:bodyPr rtlCol="0" anchor="b" anchorCtr="0"/>
-          <a:lstStyle/>
-          <a:p>
-            <a:pPr algn="ctr"/>
-            <a:endParaRPr lang="en-US" sz="1400" b="1" dirty="0" smtClean="0">
-              <a:solidFill>
-                <a:schemeClr val="tx1"/>
-              </a:solidFill>
-              <a:latin typeface="Consolas" pitchFamily="49" charset="0"/>
-              <a:cs typeface="Consolas" pitchFamily="49" charset="0"/>
-            </a:endParaRPr>
-          </a:p>
-        </p:txBody>
-      </p:sp>
-      <p:sp>
-        <p:nvSpPr>
           <p:cNvPr id="159" name="Rounded Rectangle 158"/>
           <p:cNvSpPr/>
           <p:nvPr/>
         </p:nvSpPr>
         <p:spPr>
           <a:xfrm>
-            <a:off x="2757508" y="639945"/>
-            <a:ext cx="1044850" cy="1388594"/>
+            <a:off x="1408237" y="684324"/>
+            <a:ext cx="1147089" cy="777247"/>
           </a:xfrm>
           <a:prstGeom prst="roundRect">
             <a:avLst>
@@ -3864,10 +3750,51 @@
           <a:bodyPr vert="horz" rtlCol="0" anchor="t" anchorCtr="0"/>
           <a:lstStyle/>
           <a:p>
+            <a:pPr algn="ctr"/>
+            <a:r>
+              <a:rPr lang="en-US" sz="1400" b="1" dirty="0" err="1">
+                <a:solidFill>
+                  <a:schemeClr val="bg1"/>
+                </a:solidFill>
+                <a:latin typeface="Consolas" pitchFamily="49" charset="0"/>
+                <a:cs typeface="Consolas" pitchFamily="49" charset="0"/>
+              </a:rPr>
+              <a:t>QUnit</a:t>
+            </a:r>
+            <a:endParaRPr lang="en-US" sz="1400" b="1" dirty="0">
+              <a:solidFill>
+                <a:schemeClr val="bg1"/>
+              </a:solidFill>
+              <a:latin typeface="Consolas" pitchFamily="49" charset="0"/>
+              <a:cs typeface="Consolas" pitchFamily="49" charset="0"/>
+            </a:endParaRPr>
+          </a:p>
+          <a:p>
+            <a:pPr algn="ctr"/>
+            <a:r>
+              <a:rPr lang="en-US" sz="1400" b="1" dirty="0" err="1">
+                <a:solidFill>
+                  <a:schemeClr val="bg1"/>
+                </a:solidFill>
+                <a:latin typeface="Consolas" pitchFamily="49" charset="0"/>
+                <a:cs typeface="Consolas" pitchFamily="49" charset="0"/>
+              </a:rPr>
+              <a:t>TestNG</a:t>
+            </a:r>
+            <a:endParaRPr lang="en-US" sz="1400" b="1" dirty="0">
+              <a:solidFill>
+                <a:schemeClr val="bg1"/>
+              </a:solidFill>
+              <a:latin typeface="Consolas" pitchFamily="49" charset="0"/>
+              <a:cs typeface="Consolas" pitchFamily="49" charset="0"/>
+            </a:endParaRPr>
+          </a:p>
+          <a:p>
+            <a:pPr algn="ctr"/>
             <a:r>
               <a:rPr lang="en-US" sz="1400" b="1" dirty="0">
                 <a:solidFill>
-                  <a:schemeClr val="tx1"/>
+                  <a:schemeClr val="bg1"/>
                 </a:solidFill>
                 <a:latin typeface="Consolas" pitchFamily="49" charset="0"/>
                 <a:cs typeface="Consolas" pitchFamily="49" charset="0"/>
@@ -3876,7 +3803,7 @@
             </a:r>
             <a:endParaRPr lang="en-SG" sz="1400" b="1" dirty="0">
               <a:solidFill>
-                <a:schemeClr val="tx1"/>
+                <a:schemeClr val="bg1"/>
               </a:solidFill>
               <a:latin typeface="Consolas" pitchFamily="49" charset="0"/>
               <a:cs typeface="Consolas" pitchFamily="49" charset="0"/>
@@ -3886,97 +3813,14 @@
       </p:sp>
       <p:sp>
         <p:nvSpPr>
-          <p:cNvPr id="160" name="Rounded Rectangle 159"/>
-          <p:cNvSpPr/>
-          <p:nvPr/>
-        </p:nvSpPr>
-        <p:spPr>
-          <a:xfrm>
-            <a:off x="2866231" y="1805581"/>
-            <a:ext cx="4419600" cy="321793"/>
-          </a:xfrm>
-          <a:prstGeom prst="roundRect">
-            <a:avLst>
-              <a:gd name="adj" fmla="val 9190"/>
-            </a:avLst>
-          </a:prstGeom>
-          <a:solidFill>
-            <a:schemeClr val="accent6">
-              <a:lumMod val="40000"/>
-              <a:lumOff val="60000"/>
-            </a:schemeClr>
-          </a:solidFill>
-          <a:ln>
-            <a:solidFill>
-              <a:schemeClr val="bg1"/>
-            </a:solidFill>
-          </a:ln>
-        </p:spPr>
-        <p:style>
-          <a:lnRef idx="2">
-            <a:schemeClr val="accent6">
-              <a:shade val="50000"/>
-            </a:schemeClr>
-          </a:lnRef>
-          <a:fillRef idx="1">
-            <a:schemeClr val="accent6"/>
-          </a:fillRef>
-          <a:effectRef idx="0">
-            <a:schemeClr val="accent6"/>
-          </a:effectRef>
-          <a:fontRef idx="minor">
-            <a:schemeClr val="lt1"/>
-          </a:fontRef>
-        </p:style>
-        <p:txBody>
-          <a:bodyPr rot="0" spcFirstLastPara="0" vertOverflow="overflow" horzOverflow="overflow" vert="horz" wrap="square" lIns="91440" tIns="45720" rIns="91440" bIns="45720" numCol="1" spcCol="0" rtlCol="0" fromWordArt="0" anchor="ctr" anchorCtr="0" forceAA="0" compatLnSpc="1">
-            <a:prstTxWarp prst="textNoShape">
-              <a:avLst/>
-            </a:prstTxWarp>
-            <a:noAutofit/>
-          </a:bodyPr>
-          <a:lstStyle/>
-          <a:p>
-            <a:r>
-              <a:rPr lang="en-US" sz="1400" b="1" dirty="0" smtClean="0">
-                <a:solidFill>
-                  <a:schemeClr val="tx1"/>
-                </a:solidFill>
-                <a:latin typeface="Consolas" pitchFamily="49" charset="0"/>
-                <a:cs typeface="Consolas" pitchFamily="49" charset="0"/>
-              </a:rPr>
-              <a:t>     Java, </a:t>
-            </a:r>
-            <a:r>
-              <a:rPr lang="en-US" sz="1400" b="1" dirty="0" err="1" smtClean="0">
-                <a:solidFill>
-                  <a:schemeClr val="tx1"/>
-                </a:solidFill>
-                <a:latin typeface="Consolas" pitchFamily="49" charset="0"/>
-                <a:cs typeface="Consolas" pitchFamily="49" charset="0"/>
-              </a:rPr>
-              <a:t>TestNG</a:t>
-            </a:r>
-            <a:endParaRPr lang="en-SG" sz="1400" b="1" dirty="0">
-              <a:solidFill>
-                <a:schemeClr val="tx1"/>
-              </a:solidFill>
-              <a:latin typeface="Consolas" pitchFamily="49" charset="0"/>
-              <a:cs typeface="Consolas" pitchFamily="49" charset="0"/>
-            </a:endParaRPr>
-          </a:p>
-        </p:txBody>
-      </p:sp>
-      <p:sp>
-        <p:nvSpPr>
           <p:cNvPr id="161" name="Rounded Rectangle 160"/>
           <p:cNvSpPr/>
           <p:nvPr/>
         </p:nvSpPr>
         <p:spPr>
           <a:xfrm>
-            <a:off x="1408613" y="639944"/>
-            <a:ext cx="1248102" cy="1806373"/>
+            <a:off x="146169" y="684323"/>
+            <a:ext cx="1145330" cy="1806373"/>
           </a:xfrm>
           <a:prstGeom prst="roundRect">
             <a:avLst>
@@ -4008,117 +3852,7 @@
           <a:bodyPr rtlCol="0" anchor="t" anchorCtr="0"/>
           <a:lstStyle/>
           <a:p>
-            <a:r>
-              <a:rPr lang="en-US" sz="1400" b="1" dirty="0" smtClean="0">
-                <a:solidFill>
-                  <a:schemeClr val="tx1"/>
-                </a:solidFill>
-                <a:latin typeface="Consolas" pitchFamily="49" charset="0"/>
-                <a:cs typeface="Consolas" pitchFamily="49" charset="0"/>
-              </a:rPr>
-              <a:t>HTML</a:t>
-            </a:r>
-          </a:p>
-          <a:p>
-            <a:r>
-              <a:rPr lang="en-US" sz="1400" b="1" dirty="0" smtClean="0">
-                <a:solidFill>
-                  <a:schemeClr val="tx1"/>
-                </a:solidFill>
-                <a:latin typeface="Consolas" pitchFamily="49" charset="0"/>
-                <a:cs typeface="Consolas" pitchFamily="49" charset="0"/>
-              </a:rPr>
-              <a:t>CSS</a:t>
-            </a:r>
-          </a:p>
-          <a:p>
-            <a:r>
-              <a:rPr lang="en-US" sz="1400" b="1" dirty="0" smtClean="0">
-                <a:solidFill>
-                  <a:schemeClr val="tx1"/>
-                </a:solidFill>
-                <a:latin typeface="Consolas" pitchFamily="49" charset="0"/>
-                <a:cs typeface="Consolas" pitchFamily="49" charset="0"/>
-              </a:rPr>
-              <a:t>JavaScript</a:t>
-            </a:r>
-          </a:p>
-        </p:txBody>
-      </p:sp>
-      <p:sp>
-        <p:nvSpPr>
-          <p:cNvPr id="162" name="Rounded Rectangle 161"/>
-          <p:cNvSpPr/>
-          <p:nvPr/>
-        </p:nvSpPr>
-        <p:spPr>
-          <a:xfrm>
-            <a:off x="1494630" y="2121668"/>
-            <a:ext cx="5791201" cy="307444"/>
-          </a:xfrm>
-          <a:prstGeom prst="roundRect">
-            <a:avLst>
-              <a:gd name="adj" fmla="val 9190"/>
-            </a:avLst>
-          </a:prstGeom>
-          <a:solidFill>
-            <a:schemeClr val="accent6">
-              <a:lumMod val="40000"/>
-              <a:lumOff val="60000"/>
-            </a:schemeClr>
-          </a:solidFill>
-          <a:ln>
-            <a:solidFill>
-              <a:schemeClr val="bg1"/>
-            </a:solidFill>
-          </a:ln>
-        </p:spPr>
-        <p:style>
-          <a:lnRef idx="2">
-            <a:schemeClr val="accent6">
-              <a:shade val="50000"/>
-            </a:schemeClr>
-          </a:lnRef>
-          <a:fillRef idx="1">
-            <a:schemeClr val="accent6"/>
-          </a:fillRef>
-          <a:effectRef idx="0">
-            <a:schemeClr val="accent6"/>
-          </a:effectRef>
-          <a:fontRef idx="minor">
-            <a:schemeClr val="lt1"/>
-          </a:fontRef>
-        </p:style>
-        <p:txBody>
-          <a:bodyPr rot="0" spcFirstLastPara="0" vertOverflow="overflow" horzOverflow="overflow" vert="horz" wrap="square" lIns="91440" tIns="45720" rIns="91440" bIns="45720" numCol="1" spcCol="0" rtlCol="0" fromWordArt="0" anchor="ctr" anchorCtr="0" forceAA="0" compatLnSpc="1">
-            <a:prstTxWarp prst="textNoShape">
-              <a:avLst/>
-            </a:prstTxWarp>
-            <a:noAutofit/>
-          </a:bodyPr>
-          <a:lstStyle/>
-          <a:p>
-            <a:r>
-              <a:rPr lang="en-US" sz="1400" b="1" dirty="0" smtClean="0">
-                <a:solidFill>
-                  <a:schemeClr val="tx1"/>
-                </a:solidFill>
-                <a:latin typeface="Consolas" pitchFamily="49" charset="0"/>
-                <a:cs typeface="Consolas" pitchFamily="49" charset="0"/>
-              </a:rPr>
-              <a:t>          </a:t>
-            </a:r>
-            <a:r>
-              <a:rPr lang="en-US" sz="1400" b="1" dirty="0" err="1" smtClean="0">
-                <a:solidFill>
-                  <a:schemeClr val="tx1"/>
-                </a:solidFill>
-                <a:latin typeface="Consolas" pitchFamily="49" charset="0"/>
-                <a:cs typeface="Consolas" pitchFamily="49" charset="0"/>
-              </a:rPr>
-              <a:t>Git</a:t>
-            </a:r>
-            <a:endParaRPr lang="en-SG" sz="1400" b="1" dirty="0">
+            <a:endParaRPr lang="en-US" sz="1400" b="1" dirty="0">
               <a:solidFill>
                 <a:schemeClr val="tx1"/>
               </a:solidFill>
@@ -4136,8 +3870,8 @@
         </p:nvSpPr>
         <p:spPr>
           <a:xfrm>
-            <a:off x="6324599" y="639945"/>
-            <a:ext cx="1066799" cy="983486"/>
+            <a:off x="3927645" y="684318"/>
+            <a:ext cx="1143426" cy="983486"/>
           </a:xfrm>
           <a:prstGeom prst="roundRect">
             <a:avLst>
@@ -4169,16 +3903,230 @@
           <a:bodyPr rtlCol="0" anchor="t" anchorCtr="0"/>
           <a:lstStyle/>
           <a:p>
-            <a:r>
-              <a:rPr lang="en-US" sz="1400" b="1" dirty="0" smtClean="0">
+            <a:pPr algn="ctr"/>
+            <a:r>
+              <a:rPr lang="en-US" sz="1400" b="1" dirty="0">
                 <a:solidFill>
-                  <a:schemeClr val="tx1"/>
+                  <a:schemeClr val="bg1"/>
                 </a:solidFill>
                 <a:latin typeface="Consolas" pitchFamily="49" charset="0"/>
                 <a:cs typeface="Consolas" pitchFamily="49" charset="0"/>
               </a:rPr>
-              <a:t>JDO</a:t>
-            </a:r>
+              <a:t>Objectify</a:t>
+            </a:r>
+          </a:p>
+          <a:p>
+            <a:pPr algn="ctr"/>
+            <a:r>
+              <a:rPr lang="en-US" sz="1400" b="1" dirty="0" err="1">
+                <a:solidFill>
+                  <a:schemeClr val="bg1"/>
+                </a:solidFill>
+                <a:latin typeface="Consolas" pitchFamily="49" charset="0"/>
+                <a:cs typeface="Consolas" pitchFamily="49" charset="0"/>
+              </a:rPr>
+              <a:t>Datastore</a:t>
+            </a:r>
+            <a:endParaRPr lang="en-SG" sz="1400" b="1" dirty="0">
+              <a:solidFill>
+                <a:schemeClr val="bg1"/>
+              </a:solidFill>
+              <a:latin typeface="Consolas" pitchFamily="49" charset="0"/>
+              <a:cs typeface="Consolas" pitchFamily="49" charset="0"/>
+            </a:endParaRPr>
+          </a:p>
+        </p:txBody>
+      </p:sp>
+      <p:sp>
+        <p:nvSpPr>
+          <p:cNvPr id="167" name="Rectangle 166"/>
+          <p:cNvSpPr/>
+          <p:nvPr/>
+        </p:nvSpPr>
+        <p:spPr>
+          <a:xfrm>
+            <a:off x="146169" y="107261"/>
+            <a:ext cx="1145330" cy="532710"/>
+          </a:xfrm>
+          <a:prstGeom prst="rect">
+            <a:avLst/>
+          </a:prstGeom>
+        </p:spPr>
+        <p:txBody>
+          <a:bodyPr wrap="square">
+            <a:spAutoFit/>
+          </a:bodyPr>
+          <a:lstStyle/>
+          <a:p>
+            <a:pPr algn="ctr"/>
+            <a:r>
+              <a:rPr lang="en-US" sz="1431" b="1" dirty="0">
+                <a:solidFill>
+                  <a:schemeClr val="bg1"/>
+                </a:solidFill>
+              </a:rPr>
+              <a:t>Web page developer</a:t>
+            </a:r>
+          </a:p>
+        </p:txBody>
+      </p:sp>
+      <p:sp>
+        <p:nvSpPr>
+          <p:cNvPr id="168" name="Rectangle 167"/>
+          <p:cNvSpPr/>
+          <p:nvPr/>
+        </p:nvSpPr>
+        <p:spPr>
+          <a:xfrm>
+            <a:off x="1394865" y="107261"/>
+            <a:ext cx="1185431" cy="532710"/>
+          </a:xfrm>
+          <a:prstGeom prst="rect">
+            <a:avLst/>
+          </a:prstGeom>
+        </p:spPr>
+        <p:txBody>
+          <a:bodyPr wrap="square">
+            <a:spAutoFit/>
+          </a:bodyPr>
+          <a:lstStyle/>
+          <a:p>
+            <a:pPr algn="ctr"/>
+            <a:r>
+              <a:rPr lang="en-US" sz="1431" b="1" dirty="0">
+                <a:solidFill>
+                  <a:schemeClr val="bg1"/>
+                </a:solidFill>
+              </a:rPr>
+              <a:t>Test developer</a:t>
+            </a:r>
+          </a:p>
+        </p:txBody>
+      </p:sp>
+      <p:sp>
+        <p:nvSpPr>
+          <p:cNvPr id="169" name="Rectangle 168"/>
+          <p:cNvSpPr/>
+          <p:nvPr/>
+        </p:nvSpPr>
+        <p:spPr>
+          <a:xfrm>
+            <a:off x="2668396" y="106468"/>
+            <a:ext cx="1144800" cy="532710"/>
+          </a:xfrm>
+          <a:prstGeom prst="rect">
+            <a:avLst/>
+          </a:prstGeom>
+        </p:spPr>
+        <p:txBody>
+          <a:bodyPr wrap="square">
+            <a:spAutoFit/>
+          </a:bodyPr>
+          <a:lstStyle/>
+          <a:p>
+            <a:pPr algn="ctr"/>
+            <a:r>
+              <a:rPr lang="en-US" sz="1431" b="1" dirty="0" smtClean="0">
+                <a:solidFill>
+                  <a:schemeClr val="bg1"/>
+                </a:solidFill>
+              </a:rPr>
+              <a:t>Front end </a:t>
+            </a:r>
+            <a:r>
+              <a:rPr lang="en-US" sz="1431" b="1" dirty="0">
+                <a:solidFill>
+                  <a:schemeClr val="bg1"/>
+                </a:solidFill>
+              </a:rPr>
+              <a:t>developer</a:t>
+            </a:r>
+          </a:p>
+        </p:txBody>
+      </p:sp>
+      <p:sp>
+        <p:nvSpPr>
+          <p:cNvPr id="170" name="Rectangle 169"/>
+          <p:cNvSpPr/>
+          <p:nvPr/>
+        </p:nvSpPr>
+        <p:spPr>
+          <a:xfrm>
+            <a:off x="3926271" y="100767"/>
+            <a:ext cx="1144800" cy="532710"/>
+          </a:xfrm>
+          <a:prstGeom prst="rect">
+            <a:avLst/>
+          </a:prstGeom>
+        </p:spPr>
+        <p:txBody>
+          <a:bodyPr wrap="square">
+            <a:spAutoFit/>
+          </a:bodyPr>
+          <a:lstStyle/>
+          <a:p>
+            <a:pPr algn="ctr">
+              <a:tabLst>
+                <a:tab pos="180973" algn="l"/>
+              </a:tabLst>
+            </a:pPr>
+            <a:r>
+              <a:rPr lang="en-US" sz="1431" b="1" dirty="0" smtClean="0">
+                <a:solidFill>
+                  <a:schemeClr val="bg1"/>
+                </a:solidFill>
+              </a:rPr>
+              <a:t>Back end </a:t>
+            </a:r>
+            <a:r>
+              <a:rPr lang="en-US" sz="1431" b="1" dirty="0">
+                <a:solidFill>
+                  <a:schemeClr val="bg1"/>
+                </a:solidFill>
+              </a:rPr>
+              <a:t>developer</a:t>
+            </a:r>
+          </a:p>
+        </p:txBody>
+      </p:sp>
+      <p:sp>
+        <p:nvSpPr>
+          <p:cNvPr id="22" name="Rounded Rectangle 21"/>
+          <p:cNvSpPr/>
+          <p:nvPr/>
+        </p:nvSpPr>
+        <p:spPr>
+          <a:xfrm>
+            <a:off x="5182822" y="105060"/>
+            <a:ext cx="1144800" cy="2628000"/>
+          </a:xfrm>
+          <a:prstGeom prst="roundRect">
+            <a:avLst>
+              <a:gd name="adj" fmla="val 5446"/>
+            </a:avLst>
+          </a:prstGeom>
+          <a:ln/>
+        </p:spPr>
+        <p:style>
+          <a:lnRef idx="2">
+            <a:schemeClr val="accent2">
+              <a:shade val="50000"/>
+            </a:schemeClr>
+          </a:lnRef>
+          <a:fillRef idx="1">
+            <a:schemeClr val="accent2"/>
+          </a:fillRef>
+          <a:effectRef idx="0">
+            <a:schemeClr val="accent2"/>
+          </a:effectRef>
+          <a:fontRef idx="minor">
+            <a:schemeClr val="lt1"/>
+          </a:fontRef>
+        </p:style>
+        <p:txBody>
+          <a:bodyPr rtlCol="0" anchor="b" anchorCtr="0"/>
+          <a:lstStyle/>
+          <a:p>
             <a:endParaRPr lang="en-SG" sz="1400" b="1" dirty="0">
               <a:solidFill>
                 <a:schemeClr val="tx1"/>
@@ -4191,14 +4139,14 @@
       </p:sp>
       <p:sp>
         <p:nvSpPr>
-          <p:cNvPr id="164" name="Rounded Rectangle 163"/>
+          <p:cNvPr id="23" name="Rounded Rectangle 22"/>
           <p:cNvSpPr/>
           <p:nvPr/>
         </p:nvSpPr>
         <p:spPr>
           <a:xfrm>
-            <a:off x="3899261" y="639945"/>
-            <a:ext cx="2425337" cy="983485"/>
+            <a:off x="5207795" y="699416"/>
+            <a:ext cx="1119831" cy="777247"/>
           </a:xfrm>
           <a:prstGeom prst="roundRect">
             <a:avLst>
@@ -4230,93 +4178,94 @@
           <a:bodyPr rtlCol="0" anchor="t" anchorCtr="0"/>
           <a:lstStyle/>
           <a:p>
-            <a:r>
-              <a:rPr lang="en-US" sz="1400" b="1" dirty="0" smtClean="0">
+            <a:pPr algn="ctr"/>
+            <a:r>
+              <a:rPr lang="en-US" sz="1400" b="1" dirty="0" err="1">
                 <a:solidFill>
-                  <a:schemeClr val="tx1"/>
+                  <a:schemeClr val="bg1"/>
                 </a:solidFill>
                 <a:latin typeface="Consolas" pitchFamily="49" charset="0"/>
                 <a:cs typeface="Consolas" pitchFamily="49" charset="0"/>
               </a:rPr>
-              <a:t>HTML, CSS, JavaScript, JSP, </a:t>
-            </a:r>
-            <a:r>
-              <a:rPr lang="en-US" sz="1400" b="1" smtClean="0">
+              <a:t>Gradle</a:t>
+            </a:r>
+            <a:endParaRPr lang="en-US" sz="1400" b="1" dirty="0">
+              <a:solidFill>
+                <a:schemeClr val="bg1"/>
+              </a:solidFill>
+              <a:latin typeface="Consolas" pitchFamily="49" charset="0"/>
+              <a:cs typeface="Consolas" pitchFamily="49" charset="0"/>
+            </a:endParaRPr>
+          </a:p>
+          <a:p>
+            <a:pPr algn="ctr"/>
+            <a:r>
+              <a:rPr lang="en-US" sz="1400" b="1" dirty="0">
                 <a:solidFill>
-                  <a:schemeClr val="tx1"/>
+                  <a:schemeClr val="bg1"/>
                 </a:solidFill>
                 <a:latin typeface="Consolas" pitchFamily="49" charset="0"/>
                 <a:cs typeface="Consolas" pitchFamily="49" charset="0"/>
               </a:rPr>
-              <a:t>JSTL, JQuery</a:t>
-            </a:r>
-            <a:r>
-              <a:rPr lang="en-US" sz="1400" b="1" dirty="0" smtClean="0">
-                <a:solidFill>
-                  <a:schemeClr val="tx1"/>
-                </a:solidFill>
-                <a:latin typeface="Consolas" pitchFamily="49" charset="0"/>
-                <a:cs typeface="Consolas" pitchFamily="49" charset="0"/>
-              </a:rPr>
-              <a:t>, </a:t>
-            </a:r>
-            <a:r>
-              <a:rPr lang="en-US" sz="1400" b="1" dirty="0" err="1" smtClean="0">
-                <a:solidFill>
-                  <a:schemeClr val="tx1"/>
-                </a:solidFill>
-                <a:latin typeface="Consolas" pitchFamily="49" charset="0"/>
-                <a:cs typeface="Consolas" pitchFamily="49" charset="0"/>
-              </a:rPr>
-              <a:t>QUnit</a:t>
-            </a:r>
-            <a:r>
-              <a:rPr lang="en-US" sz="1400" b="1" dirty="0" smtClean="0">
-                <a:solidFill>
-                  <a:schemeClr val="tx1"/>
-                </a:solidFill>
-                <a:latin typeface="Consolas" pitchFamily="49" charset="0"/>
-                <a:cs typeface="Consolas" pitchFamily="49" charset="0"/>
-              </a:rPr>
-              <a:t>, Selenium</a:t>
-            </a:r>
-            <a:endParaRPr lang="en-SG" sz="1400" b="1" dirty="0">
-              <a:solidFill>
-                <a:schemeClr val="tx1"/>
-              </a:solidFill>
-              <a:latin typeface="Consolas" pitchFamily="49" charset="0"/>
-              <a:cs typeface="Consolas" pitchFamily="49" charset="0"/>
-            </a:endParaRPr>
-          </a:p>
-        </p:txBody>
-      </p:sp>
-      <p:sp>
-        <p:nvSpPr>
-          <p:cNvPr id="165" name="Rounded Rectangle 164"/>
+              <a:t>Node.js</a:t>
+            </a:r>
+          </a:p>
+        </p:txBody>
+      </p:sp>
+      <p:sp>
+        <p:nvSpPr>
+          <p:cNvPr id="24" name="Rectangle 23"/>
           <p:cNvSpPr/>
           <p:nvPr/>
         </p:nvSpPr>
         <p:spPr>
           <a:xfrm>
-            <a:off x="4009230" y="1483212"/>
-            <a:ext cx="3276601" cy="321793"/>
+            <a:off x="5207795" y="115861"/>
+            <a:ext cx="1119831" cy="532710"/>
+          </a:xfrm>
+          <a:prstGeom prst="rect">
+            <a:avLst/>
+          </a:prstGeom>
+        </p:spPr>
+        <p:txBody>
+          <a:bodyPr wrap="square">
+            <a:spAutoFit/>
+          </a:bodyPr>
+          <a:lstStyle/>
+          <a:p>
+            <a:pPr algn="ctr">
+              <a:tabLst>
+                <a:tab pos="180973" algn="l"/>
+              </a:tabLst>
+            </a:pPr>
+            <a:r>
+              <a:rPr lang="en-US" sz="1431" b="1" dirty="0">
+                <a:solidFill>
+                  <a:schemeClr val="bg1"/>
+                </a:solidFill>
+              </a:rPr>
+              <a:t>DevOps developer</a:t>
+            </a:r>
+          </a:p>
+        </p:txBody>
+      </p:sp>
+      <p:sp>
+        <p:nvSpPr>
+          <p:cNvPr id="21" name="Rounded Rectangle 20"/>
+          <p:cNvSpPr/>
+          <p:nvPr/>
+        </p:nvSpPr>
+        <p:spPr>
+          <a:xfrm>
+            <a:off x="195691" y="1984029"/>
+            <a:ext cx="3566869" cy="321793"/>
           </a:xfrm>
           <a:prstGeom prst="roundRect">
             <a:avLst>
               <a:gd name="adj" fmla="val 9190"/>
             </a:avLst>
           </a:prstGeom>
-          <a:solidFill>
-            <a:schemeClr val="accent6">
-              <a:lumMod val="40000"/>
-              <a:lumOff val="60000"/>
-            </a:schemeClr>
-          </a:solidFill>
-          <a:ln>
-            <a:solidFill>
-              <a:schemeClr val="bg1"/>
-            </a:solidFill>
-          </a:ln>
+          <a:ln/>
         </p:spPr>
         <p:style>
           <a:lnRef idx="2">
@@ -4343,15 +4292,26 @@
           </a:bodyPr>
           <a:lstStyle/>
           <a:p>
-            <a:r>
-              <a:rPr lang="en-US" sz="1400" b="1" dirty="0" smtClean="0">
+            <a:pPr algn="ctr"/>
+            <a:r>
+              <a:rPr lang="en-SG" sz="1400" b="1" dirty="0">
                 <a:solidFill>
                   <a:schemeClr val="tx1"/>
                 </a:solidFill>
                 <a:latin typeface="Consolas" pitchFamily="49" charset="0"/>
                 <a:cs typeface="Consolas" pitchFamily="49" charset="0"/>
               </a:rPr>
-              <a:t>      App Engine, Servlets</a:t>
+              <a:t>HTML, CSS, JavaScript, </a:t>
+            </a:r>
+            <a:r>
+              <a:rPr lang="en-SG" sz="1400" b="1" dirty="0">
+                <a:solidFill>
+                  <a:schemeClr val="tx1"/>
+                </a:solidFill>
+                <a:latin typeface="Consolas" pitchFamily="49" charset="0"/>
+                <a:cs typeface="Consolas" pitchFamily="49" charset="0"/>
+              </a:rPr>
+              <a:t>JSP</a:t>
             </a:r>
             <a:endParaRPr lang="en-SG" sz="1400" b="1" dirty="0">
               <a:solidFill>
@@ -4365,302 +4325,148 @@
       </p:sp>
       <p:sp>
         <p:nvSpPr>
-          <p:cNvPr id="166" name="Rectangle 165"/>
+          <p:cNvPr id="160" name="Rounded Rectangle 159"/>
           <p:cNvSpPr/>
           <p:nvPr/>
         </p:nvSpPr>
         <p:spPr>
           <a:xfrm>
-            <a:off x="76200" y="2969"/>
-            <a:ext cx="1317350" cy="553998"/>
+            <a:off x="1458877" y="1606864"/>
+            <a:ext cx="4755280" cy="321793"/>
           </a:xfrm>
-          <a:prstGeom prst="rect">
-            <a:avLst/>
+          <a:prstGeom prst="roundRect">
+            <a:avLst>
+              <a:gd name="adj" fmla="val 9190"/>
+            </a:avLst>
           </a:prstGeom>
+          <a:ln/>
         </p:spPr>
-        <p:txBody>
-          <a:bodyPr wrap="square">
-            <a:spAutoFit/>
+        <p:style>
+          <a:lnRef idx="2">
+            <a:schemeClr val="accent6">
+              <a:shade val="50000"/>
+            </a:schemeClr>
+          </a:lnRef>
+          <a:fillRef idx="1">
+            <a:schemeClr val="accent6"/>
+          </a:fillRef>
+          <a:effectRef idx="0">
+            <a:schemeClr val="accent6"/>
+          </a:effectRef>
+          <a:fontRef idx="minor">
+            <a:schemeClr val="lt1"/>
+          </a:fontRef>
+        </p:style>
+        <p:txBody>
+          <a:bodyPr rot="0" spcFirstLastPara="0" vertOverflow="overflow" horzOverflow="overflow" vert="horz" wrap="square" lIns="91440" tIns="45720" rIns="91440" bIns="45720" numCol="1" spcCol="0" rtlCol="0" fromWordArt="0" anchor="ctr" anchorCtr="0" forceAA="0" compatLnSpc="1">
+            <a:prstTxWarp prst="textNoShape">
+              <a:avLst/>
+            </a:prstTxWarp>
+            <a:noAutofit/>
           </a:bodyPr>
           <a:lstStyle/>
           <a:p>
-            <a:r>
-              <a:rPr lang="en-US" b="1" dirty="0" smtClean="0">
+            <a:pPr algn="ctr"/>
+            <a:r>
+              <a:rPr lang="en-US" sz="1400" b="1" dirty="0">
                 <a:solidFill>
-                  <a:schemeClr val="bg1"/>
+                  <a:schemeClr val="tx1"/>
                 </a:solidFill>
-                <a:sym typeface="Wingdings" pitchFamily="2" charset="2"/>
+                <a:latin typeface="Consolas" pitchFamily="49" charset="0"/>
+                <a:cs typeface="Consolas" pitchFamily="49" charset="0"/>
               </a:rPr>
-              <a:t></a:t>
-            </a:r>
-            <a:r>
-              <a:rPr lang="en-US" b="1" dirty="0" smtClean="0">
+              <a:t>Java, </a:t>
+            </a:r>
+            <a:r>
+              <a:rPr lang="en-US" sz="1400" b="1" dirty="0">
                 <a:solidFill>
-                  <a:srgbClr val="C00000"/>
+                  <a:schemeClr val="tx1"/>
                 </a:solidFill>
-                <a:sym typeface="Wingdings" pitchFamily="2" charset="2"/>
+                <a:latin typeface="Consolas" pitchFamily="49" charset="0"/>
+                <a:cs typeface="Consolas" pitchFamily="49" charset="0"/>
               </a:rPr>
-              <a:t> </a:t>
-            </a:r>
-            <a:r>
-              <a:rPr lang="en-US" b="1" dirty="0" smtClean="0">
+              <a:t>Servlet, </a:t>
+            </a:r>
+            <a:r>
+              <a:rPr lang="en-US" sz="1400" b="1" dirty="0">
                 <a:solidFill>
-                  <a:srgbClr val="C00000"/>
+                  <a:schemeClr val="tx1"/>
                 </a:solidFill>
+                <a:latin typeface="Consolas" pitchFamily="49" charset="0"/>
+                <a:cs typeface="Consolas" pitchFamily="49" charset="0"/>
               </a:rPr>
-              <a:t>Tester</a:t>
-            </a:r>
-          </a:p>
-          <a:p>
-            <a:r>
-              <a:rPr lang="en-US" b="1" dirty="0">
-                <a:solidFill>
-                  <a:schemeClr val="bg1"/>
-                </a:solidFill>
-                <a:sym typeface="Wingdings" pitchFamily="2" charset="2"/>
-              </a:rPr>
-              <a:t></a:t>
-            </a:r>
-            <a:r>
-              <a:rPr lang="en-US" b="1" dirty="0">
-                <a:solidFill>
-                  <a:srgbClr val="C00000"/>
-                </a:solidFill>
-                <a:sym typeface="Wingdings" pitchFamily="2" charset="2"/>
-              </a:rPr>
-              <a:t> </a:t>
-            </a:r>
-            <a:r>
-              <a:rPr lang="en-US" b="1" dirty="0" smtClean="0">
-                <a:solidFill>
-                  <a:srgbClr val="C00000"/>
-                </a:solidFill>
-              </a:rPr>
-              <a:t>Copy editor</a:t>
-            </a:r>
-            <a:endParaRPr lang="en-US" b="1" dirty="0">
+              <a:t>Google App Engine</a:t>
+            </a:r>
+            <a:endParaRPr lang="en-SG" sz="1400" b="1" dirty="0">
               <a:solidFill>
-                <a:srgbClr val="C00000"/>
+                <a:schemeClr val="tx1"/>
               </a:solidFill>
+              <a:latin typeface="Consolas" pitchFamily="49" charset="0"/>
+              <a:cs typeface="Consolas" pitchFamily="49" charset="0"/>
             </a:endParaRPr>
           </a:p>
         </p:txBody>
       </p:sp>
       <p:sp>
         <p:nvSpPr>
-          <p:cNvPr id="167" name="Rectangle 166"/>
+          <p:cNvPr id="162" name="Rounded Rectangle 161"/>
           <p:cNvSpPr/>
           <p:nvPr/>
         </p:nvSpPr>
         <p:spPr>
           <a:xfrm>
-            <a:off x="1408613" y="2969"/>
-            <a:ext cx="1248102" cy="553998"/>
+            <a:off x="201273" y="2359269"/>
+            <a:ext cx="6012884" cy="307444"/>
           </a:xfrm>
-          <a:prstGeom prst="rect">
-            <a:avLst/>
+          <a:prstGeom prst="roundRect">
+            <a:avLst>
+              <a:gd name="adj" fmla="val 9190"/>
+            </a:avLst>
           </a:prstGeom>
+          <a:ln/>
         </p:spPr>
-        <p:txBody>
-          <a:bodyPr wrap="square">
-            <a:spAutoFit/>
+        <p:style>
+          <a:lnRef idx="2">
+            <a:schemeClr val="accent6">
+              <a:shade val="50000"/>
+            </a:schemeClr>
+          </a:lnRef>
+          <a:fillRef idx="1">
+            <a:schemeClr val="accent6"/>
+          </a:fillRef>
+          <a:effectRef idx="0">
+            <a:schemeClr val="accent6"/>
+          </a:effectRef>
+          <a:fontRef idx="minor">
+            <a:schemeClr val="lt1"/>
+          </a:fontRef>
+        </p:style>
+        <p:txBody>
+          <a:bodyPr rot="0" spcFirstLastPara="0" vertOverflow="overflow" horzOverflow="overflow" vert="horz" wrap="square" lIns="91440" tIns="45720" rIns="91440" bIns="45720" numCol="1" spcCol="0" rtlCol="0" fromWordArt="0" anchor="ctr" anchorCtr="0" forceAA="0" compatLnSpc="1">
+            <a:prstTxWarp prst="textNoShape">
+              <a:avLst/>
+            </a:prstTxWarp>
+            <a:noAutofit/>
           </a:bodyPr>
           <a:lstStyle/>
           <a:p>
-            <a:pPr marL="180975" indent="-180975"/>
-            <a:r>
-              <a:rPr lang="en-US" b="1" dirty="0">
+            <a:pPr algn="ctr"/>
+            <a:r>
+              <a:rPr lang="en-US" sz="1400" b="1" dirty="0" err="1">
                 <a:solidFill>
-                  <a:schemeClr val="bg1"/>
+                  <a:schemeClr val="tx1"/>
                 </a:solidFill>
-                <a:sym typeface="Wingdings" pitchFamily="2" charset="2"/>
+                <a:latin typeface="Consolas" pitchFamily="49" charset="0"/>
+                <a:cs typeface="Consolas" pitchFamily="49" charset="0"/>
               </a:rPr>
-              <a:t></a:t>
-            </a:r>
-            <a:r>
-              <a:rPr lang="en-US" b="1" dirty="0">
-                <a:solidFill>
-                  <a:srgbClr val="C00000"/>
-                </a:solidFill>
-                <a:sym typeface="Wingdings" pitchFamily="2" charset="2"/>
-              </a:rPr>
-              <a:t> </a:t>
-            </a:r>
-            <a:r>
-              <a:rPr lang="en-US" b="1" dirty="0" smtClean="0">
-                <a:solidFill>
-                  <a:srgbClr val="C00000"/>
-                </a:solidFill>
-              </a:rPr>
-              <a:t>Web page developer</a:t>
-            </a:r>
-            <a:endParaRPr lang="en-US" b="1" dirty="0">
+              <a:t>Git</a:t>
+            </a:r>
+            <a:endParaRPr lang="en-SG" sz="1400" b="1" dirty="0">
               <a:solidFill>
-                <a:srgbClr val="C00000"/>
+                <a:schemeClr val="tx1"/>
               </a:solidFill>
-            </a:endParaRPr>
-          </a:p>
-        </p:txBody>
-      </p:sp>
-      <p:sp>
-        <p:nvSpPr>
-          <p:cNvPr id="168" name="Rectangle 167"/>
-          <p:cNvSpPr/>
-          <p:nvPr/>
-        </p:nvSpPr>
-        <p:spPr>
-          <a:xfrm>
-            <a:off x="2713831" y="2969"/>
-            <a:ext cx="1185431" cy="553998"/>
-          </a:xfrm>
-          <a:prstGeom prst="rect">
-            <a:avLst/>
-          </a:prstGeom>
-        </p:spPr>
-        <p:txBody>
-          <a:bodyPr wrap="square">
-            <a:spAutoFit/>
-          </a:bodyPr>
-          <a:lstStyle/>
-          <a:p>
-            <a:pPr marL="180975" indent="-180975"/>
-            <a:r>
-              <a:rPr lang="en-US" b="1" dirty="0">
-                <a:solidFill>
-                  <a:schemeClr val="bg1"/>
-                </a:solidFill>
-                <a:sym typeface="Wingdings" pitchFamily="2" charset="2"/>
-              </a:rPr>
-              <a:t></a:t>
-            </a:r>
-            <a:r>
-              <a:rPr lang="en-US" b="1" dirty="0">
-                <a:solidFill>
-                  <a:srgbClr val="C00000"/>
-                </a:solidFill>
-                <a:sym typeface="Wingdings" pitchFamily="2" charset="2"/>
-              </a:rPr>
-              <a:t> </a:t>
-            </a:r>
-            <a:r>
-              <a:rPr lang="en-US" b="1" dirty="0" smtClean="0">
-                <a:solidFill>
-                  <a:srgbClr val="C00000"/>
-                </a:solidFill>
-              </a:rPr>
-              <a:t>Test developer</a:t>
-            </a:r>
-            <a:endParaRPr lang="en-US" b="1" dirty="0">
-              <a:solidFill>
-                <a:srgbClr val="C00000"/>
-              </a:solidFill>
-            </a:endParaRPr>
-          </a:p>
-        </p:txBody>
-      </p:sp>
-      <p:sp>
-        <p:nvSpPr>
-          <p:cNvPr id="169" name="Rectangle 168"/>
-          <p:cNvSpPr/>
-          <p:nvPr/>
-        </p:nvSpPr>
-        <p:spPr>
-          <a:xfrm>
-            <a:off x="4495799" y="2969"/>
-            <a:ext cx="1189832" cy="553998"/>
-          </a:xfrm>
-          <a:prstGeom prst="rect">
-            <a:avLst/>
-          </a:prstGeom>
-        </p:spPr>
-        <p:txBody>
-          <a:bodyPr wrap="square">
-            <a:spAutoFit/>
-          </a:bodyPr>
-          <a:lstStyle/>
-          <a:p>
-            <a:pPr marL="180975" indent="-180975"/>
-            <a:r>
-              <a:rPr lang="en-US" b="1" dirty="0">
-                <a:solidFill>
-                  <a:schemeClr val="bg1"/>
-                </a:solidFill>
-                <a:sym typeface="Wingdings" pitchFamily="2" charset="2"/>
-              </a:rPr>
-              <a:t></a:t>
-            </a:r>
-            <a:r>
-              <a:rPr lang="en-US" b="1" dirty="0">
-                <a:solidFill>
-                  <a:srgbClr val="C00000"/>
-                </a:solidFill>
-                <a:sym typeface="Wingdings" pitchFamily="2" charset="2"/>
-              </a:rPr>
-              <a:t> </a:t>
-            </a:r>
-            <a:r>
-              <a:rPr lang="en-US" b="1" dirty="0" smtClean="0">
-                <a:solidFill>
-                  <a:srgbClr val="C00000"/>
-                </a:solidFill>
-              </a:rPr>
-              <a:t>Frontend developer</a:t>
-            </a:r>
-            <a:endParaRPr lang="en-US" b="1" dirty="0">
-              <a:solidFill>
-                <a:srgbClr val="C00000"/>
-              </a:solidFill>
-            </a:endParaRPr>
-          </a:p>
-        </p:txBody>
-      </p:sp>
-      <p:sp>
-        <p:nvSpPr>
-          <p:cNvPr id="170" name="Rectangle 169"/>
-          <p:cNvSpPr/>
-          <p:nvPr/>
-        </p:nvSpPr>
-        <p:spPr>
-          <a:xfrm>
-            <a:off x="6247148" y="2969"/>
-            <a:ext cx="1163708" cy="553998"/>
-          </a:xfrm>
-          <a:prstGeom prst="rect">
-            <a:avLst/>
-          </a:prstGeom>
-        </p:spPr>
-        <p:txBody>
-          <a:bodyPr wrap="square">
-            <a:spAutoFit/>
-          </a:bodyPr>
-          <a:lstStyle/>
-          <a:p>
-            <a:pPr marL="180975" indent="-180975">
-              <a:tabLst>
-                <a:tab pos="180975" algn="l"/>
-              </a:tabLst>
-            </a:pPr>
-            <a:r>
-              <a:rPr lang="en-US" b="1" dirty="0">
-                <a:solidFill>
-                  <a:schemeClr val="bg1"/>
-                </a:solidFill>
-                <a:sym typeface="Wingdings" pitchFamily="2" charset="2"/>
-              </a:rPr>
-              <a:t> </a:t>
-            </a:r>
-            <a:r>
-              <a:rPr lang="en-US" b="1" dirty="0" smtClean="0">
-                <a:solidFill>
-                  <a:srgbClr val="C00000"/>
-                </a:solidFill>
-              </a:rPr>
-              <a:t>Backend developer</a:t>
-            </a:r>
-            <a:endParaRPr lang="en-US" b="1" dirty="0">
-              <a:solidFill>
-                <a:srgbClr val="C00000"/>
-              </a:solidFill>
+              <a:latin typeface="Consolas" pitchFamily="49" charset="0"/>
+              <a:cs typeface="Consolas" pitchFamily="49" charset="0"/>
             </a:endParaRPr>
           </a:p>
         </p:txBody>
@@ -4673,8 +4479,8 @@
         </p:nvCxnSpPr>
         <p:spPr>
           <a:xfrm>
-            <a:off x="76200" y="556967"/>
-            <a:ext cx="7438231" cy="0"/>
+            <a:off x="39687" y="661259"/>
+            <a:ext cx="6372000" cy="0"/>
           </a:xfrm>
           <a:prstGeom prst="line">
             <a:avLst/>
@@ -4703,14 +4509,14 @@
       </p:cxnSp>
       <p:sp>
         <p:nvSpPr>
-          <p:cNvPr id="20" name="Rounded Rectangle 19"/>
+          <p:cNvPr id="25" name="Rounded Rectangle 24"/>
           <p:cNvSpPr/>
           <p:nvPr/>
         </p:nvSpPr>
         <p:spPr>
           <a:xfrm>
-            <a:off x="201475" y="639945"/>
-            <a:ext cx="1044850" cy="1388594"/>
+            <a:off x="2674341" y="684324"/>
+            <a:ext cx="1123844" cy="777247"/>
           </a:xfrm>
           <a:prstGeom prst="roundRect">
             <a:avLst>
@@ -4742,19 +4548,33 @@
           <a:bodyPr vert="horz" rtlCol="0" anchor="t" anchorCtr="0"/>
           <a:lstStyle/>
           <a:p>
-            <a:r>
-              <a:rPr lang="en-US" sz="1400" b="1" dirty="0" smtClean="0">
+            <a:pPr algn="ctr"/>
+            <a:r>
+              <a:rPr lang="en-US" sz="1400" b="1" dirty="0">
                 <a:solidFill>
-                  <a:schemeClr val="tx1"/>
+                  <a:schemeClr val="bg1"/>
                 </a:solidFill>
                 <a:latin typeface="Consolas" pitchFamily="49" charset="0"/>
                 <a:cs typeface="Consolas" pitchFamily="49" charset="0"/>
               </a:rPr>
-              <a:t>English</a:t>
+              <a:t>jQuery</a:t>
+            </a:r>
+          </a:p>
+          <a:p>
+            <a:pPr algn="ctr"/>
+            <a:r>
+              <a:rPr lang="en-US" sz="1400" b="1" dirty="0">
+                <a:solidFill>
+                  <a:schemeClr val="bg1"/>
+                </a:solidFill>
+                <a:latin typeface="Consolas" pitchFamily="49" charset="0"/>
+                <a:cs typeface="Consolas" pitchFamily="49" charset="0"/>
+              </a:rPr>
+              <a:t>Bootstrap</a:t>
             </a:r>
             <a:endParaRPr lang="en-SG" sz="1400" b="1" dirty="0">
               <a:solidFill>
-                <a:schemeClr val="tx1"/>
+                <a:schemeClr val="bg1"/>
               </a:solidFill>
               <a:latin typeface="Consolas" pitchFamily="49" charset="0"/>
               <a:cs typeface="Consolas" pitchFamily="49" charset="0"/>

</xml_diff>

<commit_message>
Revert "[#9079] Set up Angular 6 project (#9080)"
This reverts commit e3c72454263a7aa838e944cd1101bfc88f338b7a.
</commit_message>
<xml_diff>
--- a/docs/images/RolesAndTechnologies.pptx
+++ b/docs/images/RolesAndTechnologies.pptx
@@ -10,7 +10,7 @@
   <p:sldIdLst>
     <p:sldId id="256" r:id="rId2"/>
   </p:sldIdLst>
-  <p:sldSz cx="6480175" cy="3240088"/>
+  <p:sldSz cx="6480175" cy="2879725"/>
   <p:notesSz cx="6858000" cy="9144000"/>
   <p:defaultTextStyle>
     <a:defPPr>
@@ -110,7 +110,7 @@
   <p:extLst>
     <p:ext uri="{EFAFB233-063F-42B5-8137-9DF3F51BA10A}">
       <p15:sldGuideLst xmlns:p15="http://schemas.microsoft.com/office/powerpoint/2012/main">
-        <p15:guide id="1" orient="horz" pos="1021" userDrawn="1">
+        <p15:guide id="1" orient="horz" pos="907" userDrawn="1">
           <p15:clr>
             <a:srgbClr val="A4A3A4"/>
           </p15:clr>
@@ -208,7 +208,7 @@
           <a:p>
             <a:fld id="{EB56B9F1-9881-483D-AC17-B3C6E9A32E68}" type="datetimeFigureOut">
               <a:rPr lang="en-SG" smtClean="0"/>
-              <a:t>27/8/2018</a:t>
+              <a:t>18/3/2018</a:t>
             </a:fld>
             <a:endParaRPr lang="en-SG"/>
           </a:p>
@@ -226,8 +226,8 @@
         </p:nvSpPr>
         <p:spPr>
           <a:xfrm>
-            <a:off x="0" y="685800"/>
-            <a:ext cx="6858000" cy="3429000"/>
+            <a:off x="-428625" y="685800"/>
+            <a:ext cx="7715250" cy="3429000"/>
           </a:xfrm>
           <a:prstGeom prst="rect">
             <a:avLst/>
@@ -505,8 +505,8 @@
         </p:nvSpPr>
         <p:spPr>
           <a:xfrm>
-            <a:off x="0" y="685800"/>
-            <a:ext cx="6858000" cy="3429000"/>
+            <a:off x="-428625" y="685800"/>
+            <a:ext cx="7715250" cy="3429000"/>
           </a:xfrm>
         </p:spPr>
       </p:sp>
@@ -594,8 +594,8 @@
         </p:nvSpPr>
         <p:spPr>
           <a:xfrm>
-            <a:off x="486017" y="1006529"/>
-            <a:ext cx="5508149" cy="694521"/>
+            <a:off x="486016" y="894583"/>
+            <a:ext cx="5508149" cy="617276"/>
           </a:xfrm>
         </p:spPr>
         <p:txBody>
@@ -622,8 +622,8 @@
         </p:nvSpPr>
         <p:spPr>
           <a:xfrm>
-            <a:off x="972030" y="1836055"/>
-            <a:ext cx="4536122" cy="828022"/>
+            <a:off x="972030" y="1631848"/>
+            <a:ext cx="4536122" cy="735929"/>
           </a:xfrm>
         </p:spPr>
         <p:txBody>
@@ -747,7 +747,7 @@
             <a:fld id="{1D8BD707-D9CF-40AE-B4C6-C98DA3205C09}" type="datetimeFigureOut">
               <a:rPr lang="en-US" smtClean="0"/>
               <a:pPr/>
-              <a:t>8/27/2018</a:t>
+              <a:t>3/18/2018</a:t>
             </a:fld>
             <a:endParaRPr lang="en-US"/>
           </a:p>
@@ -914,7 +914,7 @@
             <a:fld id="{1D8BD707-D9CF-40AE-B4C6-C98DA3205C09}" type="datetimeFigureOut">
               <a:rPr lang="en-US" smtClean="0"/>
               <a:pPr/>
-              <a:t>8/27/2018</a:t>
+              <a:t>3/18/2018</a:t>
             </a:fld>
             <a:endParaRPr lang="en-US"/>
           </a:p>
@@ -1000,8 +1000,8 @@
         </p:nvSpPr>
         <p:spPr>
           <a:xfrm>
-            <a:off x="4698134" y="129755"/>
-            <a:ext cx="1458040" cy="2764574"/>
+            <a:off x="4698134" y="115323"/>
+            <a:ext cx="1458040" cy="2457098"/>
           </a:xfrm>
         </p:spPr>
         <p:txBody>
@@ -1028,8 +1028,8 @@
         </p:nvSpPr>
         <p:spPr>
           <a:xfrm>
-            <a:off x="324011" y="129755"/>
-            <a:ext cx="4266116" cy="2764574"/>
+            <a:off x="324011" y="115323"/>
+            <a:ext cx="4266116" cy="2457098"/>
           </a:xfrm>
         </p:spPr>
         <p:txBody>
@@ -1091,7 +1091,7 @@
             <a:fld id="{1D8BD707-D9CF-40AE-B4C6-C98DA3205C09}" type="datetimeFigureOut">
               <a:rPr lang="en-US" smtClean="0"/>
               <a:pPr/>
-              <a:t>8/27/2018</a:t>
+              <a:t>3/18/2018</a:t>
             </a:fld>
             <a:endParaRPr lang="en-US"/>
           </a:p>
@@ -1258,7 +1258,7 @@
             <a:fld id="{1D8BD707-D9CF-40AE-B4C6-C98DA3205C09}" type="datetimeFigureOut">
               <a:rPr lang="en-US" smtClean="0"/>
               <a:pPr/>
-              <a:t>8/27/2018</a:t>
+              <a:t>3/18/2018</a:t>
             </a:fld>
             <a:endParaRPr lang="en-US"/>
           </a:p>
@@ -1344,8 +1344,8 @@
         </p:nvSpPr>
         <p:spPr>
           <a:xfrm>
-            <a:off x="511893" y="2082068"/>
-            <a:ext cx="5508149" cy="643517"/>
+            <a:off x="511892" y="1850499"/>
+            <a:ext cx="5508149" cy="571945"/>
           </a:xfrm>
         </p:spPr>
         <p:txBody>
@@ -1376,8 +1376,8 @@
         </p:nvSpPr>
         <p:spPr>
           <a:xfrm>
-            <a:off x="511893" y="1373292"/>
-            <a:ext cx="5508149" cy="708770"/>
+            <a:off x="511892" y="1220554"/>
+            <a:ext cx="5508149" cy="629940"/>
           </a:xfrm>
         </p:spPr>
         <p:txBody>
@@ -1501,7 +1501,7 @@
             <a:fld id="{1D8BD707-D9CF-40AE-B4C6-C98DA3205C09}" type="datetimeFigureOut">
               <a:rPr lang="en-US" smtClean="0"/>
               <a:pPr/>
-              <a:t>8/27/2018</a:t>
+              <a:t>3/18/2018</a:t>
             </a:fld>
             <a:endParaRPr lang="en-US"/>
           </a:p>
@@ -1610,8 +1610,8 @@
         </p:nvSpPr>
         <p:spPr>
           <a:xfrm>
-            <a:off x="324009" y="756026"/>
-            <a:ext cx="2862078" cy="2138309"/>
+            <a:off x="324009" y="671940"/>
+            <a:ext cx="2862078" cy="1900486"/>
           </a:xfrm>
         </p:spPr>
         <p:txBody>
@@ -1695,8 +1695,8 @@
         </p:nvSpPr>
         <p:spPr>
           <a:xfrm>
-            <a:off x="3294090" y="756026"/>
-            <a:ext cx="2862078" cy="2138309"/>
+            <a:off x="3294090" y="671940"/>
+            <a:ext cx="2862078" cy="1900486"/>
           </a:xfrm>
         </p:spPr>
         <p:txBody>
@@ -1786,7 +1786,7 @@
             <a:fld id="{1D8BD707-D9CF-40AE-B4C6-C98DA3205C09}" type="datetimeFigureOut">
               <a:rPr lang="en-US" smtClean="0"/>
               <a:pPr/>
-              <a:t>8/27/2018</a:t>
+              <a:t>3/18/2018</a:t>
             </a:fld>
             <a:endParaRPr lang="en-US"/>
           </a:p>
@@ -1899,8 +1899,8 @@
         </p:nvSpPr>
         <p:spPr>
           <a:xfrm>
-            <a:off x="324012" y="725278"/>
-            <a:ext cx="2863203" cy="302256"/>
+            <a:off x="324010" y="644611"/>
+            <a:ext cx="2863203" cy="268639"/>
           </a:xfrm>
         </p:spPr>
         <p:txBody>
@@ -1964,8 +1964,8 @@
         </p:nvSpPr>
         <p:spPr>
           <a:xfrm>
-            <a:off x="324012" y="1027536"/>
-            <a:ext cx="2863203" cy="1866801"/>
+            <a:off x="324010" y="913253"/>
+            <a:ext cx="2863203" cy="1659175"/>
           </a:xfrm>
         </p:spPr>
         <p:txBody>
@@ -2049,8 +2049,8 @@
         </p:nvSpPr>
         <p:spPr>
           <a:xfrm>
-            <a:off x="3291846" y="725278"/>
-            <a:ext cx="2864327" cy="302256"/>
+            <a:off x="3291844" y="644611"/>
+            <a:ext cx="2864327" cy="268639"/>
           </a:xfrm>
         </p:spPr>
         <p:txBody>
@@ -2114,8 +2114,8 @@
         </p:nvSpPr>
         <p:spPr>
           <a:xfrm>
-            <a:off x="3291846" y="1027536"/>
-            <a:ext cx="2864327" cy="1866801"/>
+            <a:off x="3291844" y="913253"/>
+            <a:ext cx="2864327" cy="1659175"/>
           </a:xfrm>
         </p:spPr>
         <p:txBody>
@@ -2205,7 +2205,7 @@
             <a:fld id="{1D8BD707-D9CF-40AE-B4C6-C98DA3205C09}" type="datetimeFigureOut">
               <a:rPr lang="en-US" smtClean="0"/>
               <a:pPr/>
-              <a:t>8/27/2018</a:t>
+              <a:t>3/18/2018</a:t>
             </a:fld>
             <a:endParaRPr lang="en-US"/>
           </a:p>
@@ -2320,7 +2320,7 @@
             <a:fld id="{1D8BD707-D9CF-40AE-B4C6-C98DA3205C09}" type="datetimeFigureOut">
               <a:rPr lang="en-US" smtClean="0"/>
               <a:pPr/>
-              <a:t>8/27/2018</a:t>
+              <a:t>3/18/2018</a:t>
             </a:fld>
             <a:endParaRPr lang="en-US"/>
           </a:p>
@@ -2412,7 +2412,7 @@
             <a:fld id="{1D8BD707-D9CF-40AE-B4C6-C98DA3205C09}" type="datetimeFigureOut">
               <a:rPr lang="en-US" smtClean="0"/>
               <a:pPr/>
-              <a:t>8/27/2018</a:t>
+              <a:t>3/18/2018</a:t>
             </a:fld>
             <a:endParaRPr lang="en-US"/>
           </a:p>
@@ -2498,8 +2498,8 @@
         </p:nvSpPr>
         <p:spPr>
           <a:xfrm>
-            <a:off x="324012" y="129009"/>
-            <a:ext cx="2131934" cy="549014"/>
+            <a:off x="324012" y="114660"/>
+            <a:ext cx="2131934" cy="487953"/>
           </a:xfrm>
         </p:spPr>
         <p:txBody>
@@ -2530,8 +2530,8 @@
         </p:nvSpPr>
         <p:spPr>
           <a:xfrm>
-            <a:off x="2533570" y="129012"/>
-            <a:ext cx="3622598" cy="2765324"/>
+            <a:off x="2533570" y="114662"/>
+            <a:ext cx="3622598" cy="2457765"/>
           </a:xfrm>
         </p:spPr>
         <p:txBody>
@@ -2615,8 +2615,8 @@
         </p:nvSpPr>
         <p:spPr>
           <a:xfrm>
-            <a:off x="324012" y="678021"/>
-            <a:ext cx="2131934" cy="2216310"/>
+            <a:off x="324012" y="602611"/>
+            <a:ext cx="2131934" cy="1969812"/>
           </a:xfrm>
         </p:spPr>
         <p:txBody>
@@ -2686,7 +2686,7 @@
             <a:fld id="{1D8BD707-D9CF-40AE-B4C6-C98DA3205C09}" type="datetimeFigureOut">
               <a:rPr lang="en-US" smtClean="0"/>
               <a:pPr/>
-              <a:t>8/27/2018</a:t>
+              <a:t>3/18/2018</a:t>
             </a:fld>
             <a:endParaRPr lang="en-US"/>
           </a:p>
@@ -2772,8 +2772,8 @@
         </p:nvSpPr>
         <p:spPr>
           <a:xfrm>
-            <a:off x="1270165" y="2268072"/>
-            <a:ext cx="3888105" cy="267757"/>
+            <a:off x="1270163" y="2015816"/>
+            <a:ext cx="3888105" cy="237977"/>
           </a:xfrm>
         </p:spPr>
         <p:txBody>
@@ -2804,8 +2804,8 @@
         </p:nvSpPr>
         <p:spPr>
           <a:xfrm>
-            <a:off x="1270165" y="289517"/>
-            <a:ext cx="3888105" cy="1944053"/>
+            <a:off x="1270163" y="257316"/>
+            <a:ext cx="3888105" cy="1727835"/>
           </a:xfrm>
         </p:spPr>
         <p:txBody>
@@ -2865,8 +2865,8 @@
         </p:nvSpPr>
         <p:spPr>
           <a:xfrm>
-            <a:off x="1270165" y="2535821"/>
-            <a:ext cx="3888105" cy="380261"/>
+            <a:off x="1270163" y="2253787"/>
+            <a:ext cx="3888105" cy="337968"/>
           </a:xfrm>
         </p:spPr>
         <p:txBody>
@@ -2936,7 +2936,7 @@
             <a:fld id="{1D8BD707-D9CF-40AE-B4C6-C98DA3205C09}" type="datetimeFigureOut">
               <a:rPr lang="en-US" smtClean="0"/>
               <a:pPr/>
-              <a:t>8/27/2018</a:t>
+              <a:t>3/18/2018</a:t>
             </a:fld>
             <a:endParaRPr lang="en-US"/>
           </a:p>
@@ -3027,8 +3027,8 @@
         </p:nvSpPr>
         <p:spPr>
           <a:xfrm>
-            <a:off x="324014" y="129762"/>
-            <a:ext cx="5832158" cy="540014"/>
+            <a:off x="324014" y="115329"/>
+            <a:ext cx="5832158" cy="479954"/>
           </a:xfrm>
           <a:prstGeom prst="rect">
             <a:avLst/>
@@ -3060,8 +3060,8 @@
         </p:nvSpPr>
         <p:spPr>
           <a:xfrm>
-            <a:off x="324014" y="756026"/>
-            <a:ext cx="5832158" cy="2138309"/>
+            <a:off x="324014" y="671940"/>
+            <a:ext cx="5832158" cy="1900486"/>
           </a:xfrm>
           <a:prstGeom prst="rect">
             <a:avLst/>
@@ -3122,8 +3122,8 @@
         </p:nvSpPr>
         <p:spPr>
           <a:xfrm>
-            <a:off x="324017" y="3003089"/>
-            <a:ext cx="1512041" cy="172505"/>
+            <a:off x="324015" y="2669085"/>
+            <a:ext cx="1512041" cy="153319"/>
           </a:xfrm>
           <a:prstGeom prst="rect">
             <a:avLst/>
@@ -3146,7 +3146,7 @@
             <a:fld id="{1D8BD707-D9CF-40AE-B4C6-C98DA3205C09}" type="datetimeFigureOut">
               <a:rPr lang="en-US" smtClean="0"/>
               <a:pPr/>
-              <a:t>8/27/2018</a:t>
+              <a:t>3/18/2018</a:t>
             </a:fld>
             <a:endParaRPr lang="en-US"/>
           </a:p>
@@ -3164,8 +3164,8 @@
         </p:nvSpPr>
         <p:spPr>
           <a:xfrm>
-            <a:off x="2214063" y="3003089"/>
-            <a:ext cx="2052056" cy="172505"/>
+            <a:off x="2214063" y="2669085"/>
+            <a:ext cx="2052056" cy="153319"/>
           </a:xfrm>
           <a:prstGeom prst="rect">
             <a:avLst/>
@@ -3201,8 +3201,8 @@
         </p:nvSpPr>
         <p:spPr>
           <a:xfrm>
-            <a:off x="4644133" y="3003089"/>
-            <a:ext cx="1512041" cy="172505"/>
+            <a:off x="4644131" y="2669085"/>
+            <a:ext cx="1512041" cy="153319"/>
           </a:xfrm>
           <a:prstGeom prst="rect">
             <a:avLst/>
@@ -3525,8 +3525,8 @@
         </p:nvSpPr>
         <p:spPr>
           <a:xfrm>
-            <a:off x="3926271" y="115844"/>
-            <a:ext cx="1144800" cy="2952000"/>
+            <a:off x="3926271" y="107260"/>
+            <a:ext cx="1144800" cy="2628000"/>
           </a:xfrm>
           <a:prstGeom prst="roundRect">
             <a:avLst>
@@ -3573,8 +3573,8 @@
         </p:nvSpPr>
         <p:spPr>
           <a:xfrm>
-            <a:off x="2668396" y="115844"/>
-            <a:ext cx="1144800" cy="2952000"/>
+            <a:off x="2668396" y="107260"/>
+            <a:ext cx="1144800" cy="2628000"/>
           </a:xfrm>
           <a:prstGeom prst="roundRect">
             <a:avLst>
@@ -3621,8 +3621,8 @@
         </p:nvSpPr>
         <p:spPr>
           <a:xfrm>
-            <a:off x="1410520" y="115844"/>
-            <a:ext cx="1144800" cy="2952000"/>
+            <a:off x="1410520" y="107260"/>
+            <a:ext cx="1144800" cy="2628000"/>
           </a:xfrm>
           <a:prstGeom prst="roundRect">
             <a:avLst>
@@ -3669,8 +3669,8 @@
         </p:nvSpPr>
         <p:spPr>
           <a:xfrm>
-            <a:off x="146698" y="115844"/>
-            <a:ext cx="1144800" cy="2952000"/>
+            <a:off x="146698" y="107260"/>
+            <a:ext cx="1144800" cy="2628000"/>
           </a:xfrm>
           <a:prstGeom prst="roundRect">
             <a:avLst>
@@ -3717,7 +3717,7 @@
         </p:nvSpPr>
         <p:spPr>
           <a:xfrm>
-            <a:off x="1408239" y="692910"/>
+            <a:off x="1408237" y="684324"/>
             <a:ext cx="1147089" cy="777247"/>
           </a:xfrm>
           <a:prstGeom prst="roundRect">
@@ -3751,6 +3751,16 @@
           <a:lstStyle/>
           <a:p>
             <a:pPr algn="ctr"/>
+            <a:r>
+              <a:rPr lang="en-US" sz="1400" b="1" dirty="0" err="1">
+                <a:solidFill>
+                  <a:schemeClr val="bg1"/>
+                </a:solidFill>
+                <a:latin typeface="Consolas" pitchFamily="49" charset="0"/>
+                <a:cs typeface="Consolas" pitchFamily="49" charset="0"/>
+              </a:rPr>
+              <a:t>QUnit</a:t>
+            </a:r>
             <a:endParaRPr lang="en-US" sz="1400" b="1" dirty="0">
               <a:solidFill>
                 <a:schemeClr val="bg1"/>
@@ -3759,6 +3769,46 @@
               <a:cs typeface="Consolas" pitchFamily="49" charset="0"/>
             </a:endParaRPr>
           </a:p>
+          <a:p>
+            <a:pPr algn="ctr"/>
+            <a:r>
+              <a:rPr lang="en-US" sz="1400" b="1" dirty="0" err="1">
+                <a:solidFill>
+                  <a:schemeClr val="bg1"/>
+                </a:solidFill>
+                <a:latin typeface="Consolas" pitchFamily="49" charset="0"/>
+                <a:cs typeface="Consolas" pitchFamily="49" charset="0"/>
+              </a:rPr>
+              <a:t>TestNG</a:t>
+            </a:r>
+            <a:endParaRPr lang="en-US" sz="1400" b="1" dirty="0">
+              <a:solidFill>
+                <a:schemeClr val="bg1"/>
+              </a:solidFill>
+              <a:latin typeface="Consolas" pitchFamily="49" charset="0"/>
+              <a:cs typeface="Consolas" pitchFamily="49" charset="0"/>
+            </a:endParaRPr>
+          </a:p>
+          <a:p>
+            <a:pPr algn="ctr"/>
+            <a:r>
+              <a:rPr lang="en-US" sz="1400" b="1" dirty="0">
+                <a:solidFill>
+                  <a:schemeClr val="bg1"/>
+                </a:solidFill>
+                <a:latin typeface="Consolas" pitchFamily="49" charset="0"/>
+                <a:cs typeface="Consolas" pitchFamily="49" charset="0"/>
+              </a:rPr>
+              <a:t>Selenium</a:t>
+            </a:r>
+            <a:endParaRPr lang="en-SG" sz="1400" b="1" dirty="0">
+              <a:solidFill>
+                <a:schemeClr val="bg1"/>
+              </a:solidFill>
+              <a:latin typeface="Consolas" pitchFamily="49" charset="0"/>
+              <a:cs typeface="Consolas" pitchFamily="49" charset="0"/>
+            </a:endParaRPr>
+          </a:p>
         </p:txBody>
       </p:sp>
       <p:sp>
@@ -3769,7 +3819,7 @@
         </p:nvSpPr>
         <p:spPr>
           <a:xfrm>
-            <a:off x="146169" y="692909"/>
+            <a:off x="146169" y="684323"/>
             <a:ext cx="1145330" cy="1806373"/>
           </a:xfrm>
           <a:prstGeom prst="roundRect">
@@ -3820,7 +3870,7 @@
         </p:nvSpPr>
         <p:spPr>
           <a:xfrm>
-            <a:off x="3927645" y="692902"/>
+            <a:off x="3927645" y="684318"/>
             <a:ext cx="1143426" cy="983486"/>
           </a:xfrm>
           <a:prstGeom prst="roundRect">
@@ -3855,6 +3905,19 @@
           <a:p>
             <a:pPr algn="ctr"/>
             <a:r>
+              <a:rPr lang="en-US" sz="1400" b="1" dirty="0">
+                <a:solidFill>
+                  <a:schemeClr val="bg1"/>
+                </a:solidFill>
+                <a:latin typeface="Consolas" pitchFamily="49" charset="0"/>
+                <a:cs typeface="Consolas" pitchFamily="49" charset="0"/>
+              </a:rPr>
+              <a:t>Objectify</a:t>
+            </a:r>
+          </a:p>
+          <a:p>
+            <a:pPr algn="ctr"/>
+            <a:r>
               <a:rPr lang="en-US" sz="1400" b="1" dirty="0" err="1">
                 <a:solidFill>
                   <a:schemeClr val="bg1"/>
@@ -3862,27 +3925,7 @@
                 <a:latin typeface="Consolas" pitchFamily="49" charset="0"/>
                 <a:cs typeface="Consolas" pitchFamily="49" charset="0"/>
               </a:rPr>
-              <a:t>Gradle</a:t>
-            </a:r>
-            <a:endParaRPr lang="en-US" sz="1400" b="1" dirty="0">
-              <a:solidFill>
-                <a:schemeClr val="bg1"/>
-              </a:solidFill>
-              <a:latin typeface="Consolas" pitchFamily="49" charset="0"/>
-              <a:cs typeface="Consolas" pitchFamily="49" charset="0"/>
-            </a:endParaRPr>
-          </a:p>
-          <a:p>
-            <a:pPr algn="ctr"/>
-            <a:r>
-              <a:rPr lang="en-US" sz="1400" b="1" dirty="0">
-                <a:solidFill>
-                  <a:schemeClr val="bg1"/>
-                </a:solidFill>
-                <a:latin typeface="Consolas" pitchFamily="49" charset="0"/>
-                <a:cs typeface="Consolas" pitchFamily="49" charset="0"/>
-              </a:rPr>
-              <a:t>Node.js</a:t>
+              <a:t>Datastore</a:t>
             </a:r>
             <a:endParaRPr lang="en-SG" sz="1400" b="1" dirty="0">
               <a:solidFill>
@@ -3902,7 +3945,7 @@
         </p:nvSpPr>
         <p:spPr>
           <a:xfrm>
-            <a:off x="146169" y="115845"/>
+            <a:off x="146169" y="107261"/>
             <a:ext cx="1145330" cy="532710"/>
           </a:xfrm>
           <a:prstGeom prst="rect">
@@ -3935,7 +3978,7 @@
         </p:nvSpPr>
         <p:spPr>
           <a:xfrm>
-            <a:off x="1394867" y="115845"/>
+            <a:off x="1394865" y="107261"/>
             <a:ext cx="1185431" cy="532710"/>
           </a:xfrm>
           <a:prstGeom prst="rect">
@@ -3955,13 +3998,8 @@
                   <a:schemeClr val="bg1"/>
                 </a:solidFill>
               </a:rPr>
-              <a:t>Front-end developer</a:t>
-            </a:r>
-            <a:endParaRPr lang="en-US" sz="1431" b="1" dirty="0">
-              <a:solidFill>
-                <a:schemeClr val="bg1"/>
-              </a:solidFill>
-            </a:endParaRPr>
+              <a:t>Test developer</a:t>
+            </a:r>
           </a:p>
         </p:txBody>
       </p:sp>
@@ -3973,7 +4011,7 @@
         </p:nvSpPr>
         <p:spPr>
           <a:xfrm>
-            <a:off x="2668396" y="115052"/>
+            <a:off x="2668396" y="106468"/>
             <a:ext cx="1144800" cy="532710"/>
           </a:xfrm>
           <a:prstGeom prst="rect">
@@ -3988,18 +4026,21 @@
           <a:p>
             <a:pPr algn="ctr"/>
             <a:r>
+              <a:rPr lang="en-US" sz="1431" b="1" dirty="0" smtClean="0">
+                <a:solidFill>
+                  <a:schemeClr val="bg1"/>
+                </a:solidFill>
+              </a:rPr>
+              <a:t>Front end </a:t>
+            </a:r>
+            <a:r>
               <a:rPr lang="en-US" sz="1431" b="1" dirty="0">
                 <a:solidFill>
                   <a:schemeClr val="bg1"/>
                 </a:solidFill>
               </a:rPr>
-              <a:t>Test developer</a:t>
-            </a:r>
-            <a:endParaRPr lang="en-US" sz="1431" b="1" dirty="0">
-              <a:solidFill>
-                <a:schemeClr val="bg1"/>
-              </a:solidFill>
-            </a:endParaRPr>
+              <a:t>developer</a:t>
+            </a:r>
           </a:p>
         </p:txBody>
       </p:sp>
@@ -4011,7 +4052,7 @@
         </p:nvSpPr>
         <p:spPr>
           <a:xfrm>
-            <a:off x="3926271" y="109351"/>
+            <a:off x="3926271" y="100767"/>
             <a:ext cx="1144800" cy="532710"/>
           </a:xfrm>
           <a:prstGeom prst="rect">
@@ -4030,18 +4071,21 @@
               </a:tabLst>
             </a:pPr>
             <a:r>
+              <a:rPr lang="en-US" sz="1431" b="1" dirty="0" smtClean="0">
+                <a:solidFill>
+                  <a:schemeClr val="bg1"/>
+                </a:solidFill>
+              </a:rPr>
+              <a:t>Back end </a:t>
+            </a:r>
+            <a:r>
               <a:rPr lang="en-US" sz="1431" b="1" dirty="0">
                 <a:solidFill>
                   <a:schemeClr val="bg1"/>
                 </a:solidFill>
               </a:rPr>
-              <a:t>DevOps developer</a:t>
-            </a:r>
-            <a:endParaRPr lang="en-US" sz="1431" b="1" dirty="0">
-              <a:solidFill>
-                <a:schemeClr val="bg1"/>
-              </a:solidFill>
-            </a:endParaRPr>
+              <a:t>developer</a:t>
+            </a:r>
           </a:p>
         </p:txBody>
       </p:sp>
@@ -4053,8 +4097,8 @@
         </p:nvSpPr>
         <p:spPr>
           <a:xfrm>
-            <a:off x="5182822" y="113644"/>
-            <a:ext cx="1144800" cy="2952000"/>
+            <a:off x="5182822" y="105060"/>
+            <a:ext cx="1144800" cy="2628000"/>
           </a:xfrm>
           <a:prstGeom prst="roundRect">
             <a:avLst>
@@ -4101,7 +4145,7 @@
         </p:nvSpPr>
         <p:spPr>
           <a:xfrm>
-            <a:off x="5207797" y="708002"/>
+            <a:off x="5207795" y="699416"/>
             <a:ext cx="1119831" cy="777247"/>
           </a:xfrm>
           <a:prstGeom prst="roundRect">
@@ -4136,6 +4180,26 @@
           <a:p>
             <a:pPr algn="ctr"/>
             <a:r>
+              <a:rPr lang="en-US" sz="1400" b="1" dirty="0" err="1">
+                <a:solidFill>
+                  <a:schemeClr val="bg1"/>
+                </a:solidFill>
+                <a:latin typeface="Consolas" pitchFamily="49" charset="0"/>
+                <a:cs typeface="Consolas" pitchFamily="49" charset="0"/>
+              </a:rPr>
+              <a:t>Gradle</a:t>
+            </a:r>
+            <a:endParaRPr lang="en-US" sz="1400" b="1" dirty="0">
+              <a:solidFill>
+                <a:schemeClr val="bg1"/>
+              </a:solidFill>
+              <a:latin typeface="Consolas" pitchFamily="49" charset="0"/>
+              <a:cs typeface="Consolas" pitchFamily="49" charset="0"/>
+            </a:endParaRPr>
+          </a:p>
+          <a:p>
+            <a:pPr algn="ctr"/>
+            <a:r>
               <a:rPr lang="en-US" sz="1400" b="1" dirty="0">
                 <a:solidFill>
                   <a:schemeClr val="bg1"/>
@@ -4143,28 +4207,8 @@
                 <a:latin typeface="Consolas" pitchFamily="49" charset="0"/>
                 <a:cs typeface="Consolas" pitchFamily="49" charset="0"/>
               </a:rPr>
-              <a:t>Objectify</a:t>
-            </a:r>
-          </a:p>
-          <a:p>
-            <a:pPr algn="ctr"/>
-            <a:r>
-              <a:rPr lang="en-US" sz="1400" b="1" dirty="0" err="1">
-                <a:solidFill>
-                  <a:schemeClr val="bg1"/>
-                </a:solidFill>
-                <a:latin typeface="Consolas" pitchFamily="49" charset="0"/>
-                <a:cs typeface="Consolas" pitchFamily="49" charset="0"/>
-              </a:rPr>
-              <a:t>Datastore</a:t>
-            </a:r>
-            <a:endParaRPr lang="en-US" sz="1400" b="1" dirty="0">
-              <a:solidFill>
-                <a:schemeClr val="bg1"/>
-              </a:solidFill>
-              <a:latin typeface="Consolas" pitchFamily="49" charset="0"/>
-              <a:cs typeface="Consolas" pitchFamily="49" charset="0"/>
-            </a:endParaRPr>
+              <a:t>Node.js</a:t>
+            </a:r>
           </a:p>
         </p:txBody>
       </p:sp>
@@ -4176,7 +4220,7 @@
         </p:nvSpPr>
         <p:spPr>
           <a:xfrm>
-            <a:off x="5207797" y="124445"/>
+            <a:off x="5207795" y="115861"/>
             <a:ext cx="1119831" cy="532710"/>
           </a:xfrm>
           <a:prstGeom prst="rect">
@@ -4200,13 +4244,8 @@
                   <a:schemeClr val="bg1"/>
                 </a:solidFill>
               </a:rPr>
-              <a:t>Back-end developer</a:t>
-            </a:r>
-            <a:endParaRPr lang="en-US" sz="1431" b="1" dirty="0">
-              <a:solidFill>
-                <a:schemeClr val="bg1"/>
-              </a:solidFill>
-            </a:endParaRPr>
+              <a:t>DevOps developer</a:t>
+            </a:r>
           </a:p>
         </p:txBody>
       </p:sp>
@@ -4218,8 +4257,8 @@
         </p:nvSpPr>
         <p:spPr>
           <a:xfrm>
-            <a:off x="195691" y="2267008"/>
-            <a:ext cx="2304000" cy="321793"/>
+            <a:off x="195691" y="1984029"/>
+            <a:ext cx="3566869" cy="321793"/>
           </a:xfrm>
           <a:prstGeom prst="roundRect">
             <a:avLst>
@@ -4262,7 +4301,7 @@
                 <a:latin typeface="Consolas" pitchFamily="49" charset="0"/>
                 <a:cs typeface="Consolas" pitchFamily="49" charset="0"/>
               </a:rPr>
-              <a:t>HTML, </a:t>
+              <a:t>HTML, CSS, JavaScript, </a:t>
             </a:r>
             <a:r>
               <a:rPr lang="en-SG" sz="1400" b="1" dirty="0">
@@ -4272,27 +4311,7 @@
                 <a:latin typeface="Consolas" pitchFamily="49" charset="0"/>
                 <a:cs typeface="Consolas" pitchFamily="49" charset="0"/>
               </a:rPr>
-              <a:t>SCSS</a:t>
-            </a:r>
-            <a:r>
-              <a:rPr lang="en-SG" sz="1400" b="1" dirty="0">
-                <a:solidFill>
-                  <a:schemeClr val="tx1"/>
-                </a:solidFill>
-                <a:latin typeface="Consolas" pitchFamily="49" charset="0"/>
-                <a:cs typeface="Consolas" pitchFamily="49" charset="0"/>
-              </a:rPr>
-              <a:t>, </a:t>
-            </a:r>
-            <a:r>
-              <a:rPr lang="en-SG" sz="1400" b="1" dirty="0">
-                <a:solidFill>
-                  <a:schemeClr val="tx1"/>
-                </a:solidFill>
-                <a:latin typeface="Consolas" pitchFamily="49" charset="0"/>
-                <a:cs typeface="Consolas" pitchFamily="49" charset="0"/>
-              </a:rPr>
-              <a:t>Bootstrap</a:t>
+              <a:t>JSP</a:t>
             </a:r>
             <a:endParaRPr lang="en-SG" sz="1400" b="1" dirty="0">
               <a:solidFill>
@@ -4312,8 +4331,8 @@
         </p:nvSpPr>
         <p:spPr>
           <a:xfrm>
-            <a:off x="2706687" y="1505008"/>
-            <a:ext cx="3581400" cy="321793"/>
+            <a:off x="1458877" y="1606864"/>
+            <a:ext cx="4755280" cy="321793"/>
           </a:xfrm>
           <a:prstGeom prst="roundRect">
             <a:avLst>
@@ -4356,7 +4375,27 @@
                 <a:latin typeface="Consolas" pitchFamily="49" charset="0"/>
                 <a:cs typeface="Consolas" pitchFamily="49" charset="0"/>
               </a:rPr>
-              <a:t>Java, Servlet, Google App Engine</a:t>
+              <a:t>Java, </a:t>
+            </a:r>
+            <a:r>
+              <a:rPr lang="en-US" sz="1400" b="1" dirty="0">
+                <a:solidFill>
+                  <a:schemeClr val="tx1"/>
+                </a:solidFill>
+                <a:latin typeface="Consolas" pitchFamily="49" charset="0"/>
+                <a:cs typeface="Consolas" pitchFamily="49" charset="0"/>
+              </a:rPr>
+              <a:t>Servlet, </a:t>
+            </a:r>
+            <a:r>
+              <a:rPr lang="en-US" sz="1400" b="1" dirty="0">
+                <a:solidFill>
+                  <a:schemeClr val="tx1"/>
+                </a:solidFill>
+                <a:latin typeface="Consolas" pitchFamily="49" charset="0"/>
+                <a:cs typeface="Consolas" pitchFamily="49" charset="0"/>
+              </a:rPr>
+              <a:t>Google App Engine</a:t>
             </a:r>
             <a:endParaRPr lang="en-SG" sz="1400" b="1" dirty="0">
               <a:solidFill>
@@ -4376,8 +4415,8 @@
         </p:nvSpPr>
         <p:spPr>
           <a:xfrm>
-            <a:off x="201273" y="2665000"/>
-            <a:ext cx="6086814" cy="307444"/>
+            <a:off x="201273" y="2359269"/>
+            <a:ext cx="6012884" cy="307444"/>
           </a:xfrm>
           <a:prstGeom prst="roundRect">
             <a:avLst>
@@ -4440,7 +4479,7 @@
         </p:nvCxnSpPr>
         <p:spPr>
           <a:xfrm>
-            <a:off x="39687" y="669843"/>
+            <a:off x="39687" y="661259"/>
             <a:ext cx="6372000" cy="0"/>
           </a:xfrm>
           <a:prstGeom prst="line">
@@ -4476,7 +4515,7 @@
         </p:nvSpPr>
         <p:spPr>
           <a:xfrm>
-            <a:off x="2674341" y="692910"/>
+            <a:off x="2674341" y="684324"/>
             <a:ext cx="1123844" cy="777247"/>
           </a:xfrm>
           <a:prstGeom prst="roundRect">
@@ -4511,26 +4550,6 @@
           <a:p>
             <a:pPr algn="ctr"/>
             <a:r>
-              <a:rPr lang="en-US" sz="1400" b="1" dirty="0" err="1">
-                <a:solidFill>
-                  <a:schemeClr val="bg1"/>
-                </a:solidFill>
-                <a:latin typeface="Consolas" pitchFamily="49" charset="0"/>
-                <a:cs typeface="Consolas" pitchFamily="49" charset="0"/>
-              </a:rPr>
-              <a:t>TestNG</a:t>
-            </a:r>
-            <a:endParaRPr lang="en-US" sz="1400" b="1" dirty="0">
-              <a:solidFill>
-                <a:schemeClr val="bg1"/>
-              </a:solidFill>
-              <a:latin typeface="Consolas" pitchFamily="49" charset="0"/>
-              <a:cs typeface="Consolas" pitchFamily="49" charset="0"/>
-            </a:endParaRPr>
-          </a:p>
-          <a:p>
-            <a:pPr algn="ctr"/>
-            <a:r>
               <a:rPr lang="en-US" sz="1400" b="1" dirty="0">
                 <a:solidFill>
                   <a:schemeClr val="bg1"/>
@@ -4538,7 +4557,7 @@
                 <a:latin typeface="Consolas" pitchFamily="49" charset="0"/>
                 <a:cs typeface="Consolas" pitchFamily="49" charset="0"/>
               </a:rPr>
-              <a:t>Selenium</a:t>
+              <a:t>jQuery</a:t>
             </a:r>
           </a:p>
           <a:p>
@@ -4551,78 +4570,11 @@
                 <a:latin typeface="Consolas" pitchFamily="49" charset="0"/>
                 <a:cs typeface="Consolas" pitchFamily="49" charset="0"/>
               </a:rPr>
-              <a:t>Jasmine</a:t>
-            </a:r>
-          </a:p>
-        </p:txBody>
-      </p:sp>
-      <p:sp>
-        <p:nvSpPr>
-          <p:cNvPr id="27" name="Rounded Rectangle 26"/>
-          <p:cNvSpPr/>
-          <p:nvPr/>
-        </p:nvSpPr>
-        <p:spPr>
-          <a:xfrm>
-            <a:off x="195691" y="1886008"/>
-            <a:ext cx="4824000" cy="321793"/>
-          </a:xfrm>
-          <a:prstGeom prst="roundRect">
-            <a:avLst>
-              <a:gd name="adj" fmla="val 9190"/>
-            </a:avLst>
-          </a:prstGeom>
-          <a:ln/>
-        </p:spPr>
-        <p:style>
-          <a:lnRef idx="2">
-            <a:schemeClr val="accent6">
-              <a:shade val="50000"/>
-            </a:schemeClr>
-          </a:lnRef>
-          <a:fillRef idx="1">
-            <a:schemeClr val="accent6"/>
-          </a:fillRef>
-          <a:effectRef idx="0">
-            <a:schemeClr val="accent6"/>
-          </a:effectRef>
-          <a:fontRef idx="minor">
-            <a:schemeClr val="lt1"/>
-          </a:fontRef>
-        </p:style>
-        <p:txBody>
-          <a:bodyPr rot="0" spcFirstLastPara="0" vertOverflow="overflow" horzOverflow="overflow" vert="horz" wrap="square" lIns="91440" tIns="45720" rIns="91440" bIns="45720" numCol="1" spcCol="0" rtlCol="0" fromWordArt="0" anchor="ctr" anchorCtr="0" forceAA="0" compatLnSpc="1">
-            <a:prstTxWarp prst="textNoShape">
-              <a:avLst/>
-            </a:prstTxWarp>
-            <a:noAutofit/>
-          </a:bodyPr>
-          <a:lstStyle/>
-          <a:p>
-            <a:pPr algn="ctr"/>
-            <a:r>
-              <a:rPr lang="en-SG" sz="1400" b="1" dirty="0">
-                <a:solidFill>
-                  <a:schemeClr val="tx1"/>
-                </a:solidFill>
-                <a:latin typeface="Consolas" pitchFamily="49" charset="0"/>
-                <a:cs typeface="Consolas" pitchFamily="49" charset="0"/>
-              </a:rPr>
-              <a:t>Angular, </a:t>
-            </a:r>
-            <a:r>
-              <a:rPr lang="en-SG" sz="1400" b="1" dirty="0" err="1">
-                <a:solidFill>
-                  <a:schemeClr val="tx1"/>
-                </a:solidFill>
-                <a:latin typeface="Consolas" pitchFamily="49" charset="0"/>
-                <a:cs typeface="Consolas" pitchFamily="49" charset="0"/>
-              </a:rPr>
-              <a:t>TypeScript</a:t>
+              <a:t>Bootstrap</a:t>
             </a:r>
             <a:endParaRPr lang="en-SG" sz="1400" b="1" dirty="0">
               <a:solidFill>
-                <a:schemeClr val="tx1"/>
+                <a:schemeClr val="bg1"/>
               </a:solidFill>
               <a:latin typeface="Consolas" pitchFamily="49" charset="0"/>
               <a:cs typeface="Consolas" pitchFamily="49" charset="0"/>

</xml_diff>

<commit_message>
Use Jest to replace Karma/Jasmine
</commit_message>
<xml_diff>
--- a/docs/images/RolesAndTechnologies.pptx
+++ b/docs/images/RolesAndTechnologies.pptx
@@ -208,7 +208,7 @@
           <a:p>
             <a:fld id="{EB56B9F1-9881-483D-AC17-B3C6E9A32E68}" type="datetimeFigureOut">
               <a:rPr lang="en-SG" smtClean="0"/>
-              <a:t>27/8/2018</a:t>
+              <a:t>7/12/2018</a:t>
             </a:fld>
             <a:endParaRPr lang="en-SG"/>
           </a:p>
@@ -747,7 +747,7 @@
             <a:fld id="{1D8BD707-D9CF-40AE-B4C6-C98DA3205C09}" type="datetimeFigureOut">
               <a:rPr lang="en-US" smtClean="0"/>
               <a:pPr/>
-              <a:t>8/27/2018</a:t>
+              <a:t>12/7/2018</a:t>
             </a:fld>
             <a:endParaRPr lang="en-US"/>
           </a:p>
@@ -914,7 +914,7 @@
             <a:fld id="{1D8BD707-D9CF-40AE-B4C6-C98DA3205C09}" type="datetimeFigureOut">
               <a:rPr lang="en-US" smtClean="0"/>
               <a:pPr/>
-              <a:t>8/27/2018</a:t>
+              <a:t>12/7/2018</a:t>
             </a:fld>
             <a:endParaRPr lang="en-US"/>
           </a:p>
@@ -1091,7 +1091,7 @@
             <a:fld id="{1D8BD707-D9CF-40AE-B4C6-C98DA3205C09}" type="datetimeFigureOut">
               <a:rPr lang="en-US" smtClean="0"/>
               <a:pPr/>
-              <a:t>8/27/2018</a:t>
+              <a:t>12/7/2018</a:t>
             </a:fld>
             <a:endParaRPr lang="en-US"/>
           </a:p>
@@ -1258,7 +1258,7 @@
             <a:fld id="{1D8BD707-D9CF-40AE-B4C6-C98DA3205C09}" type="datetimeFigureOut">
               <a:rPr lang="en-US" smtClean="0"/>
               <a:pPr/>
-              <a:t>8/27/2018</a:t>
+              <a:t>12/7/2018</a:t>
             </a:fld>
             <a:endParaRPr lang="en-US"/>
           </a:p>
@@ -1501,7 +1501,7 @@
             <a:fld id="{1D8BD707-D9CF-40AE-B4C6-C98DA3205C09}" type="datetimeFigureOut">
               <a:rPr lang="en-US" smtClean="0"/>
               <a:pPr/>
-              <a:t>8/27/2018</a:t>
+              <a:t>12/7/2018</a:t>
             </a:fld>
             <a:endParaRPr lang="en-US"/>
           </a:p>
@@ -1786,7 +1786,7 @@
             <a:fld id="{1D8BD707-D9CF-40AE-B4C6-C98DA3205C09}" type="datetimeFigureOut">
               <a:rPr lang="en-US" smtClean="0"/>
               <a:pPr/>
-              <a:t>8/27/2018</a:t>
+              <a:t>12/7/2018</a:t>
             </a:fld>
             <a:endParaRPr lang="en-US"/>
           </a:p>
@@ -2205,7 +2205,7 @@
             <a:fld id="{1D8BD707-D9CF-40AE-B4C6-C98DA3205C09}" type="datetimeFigureOut">
               <a:rPr lang="en-US" smtClean="0"/>
               <a:pPr/>
-              <a:t>8/27/2018</a:t>
+              <a:t>12/7/2018</a:t>
             </a:fld>
             <a:endParaRPr lang="en-US"/>
           </a:p>
@@ -2320,7 +2320,7 @@
             <a:fld id="{1D8BD707-D9CF-40AE-B4C6-C98DA3205C09}" type="datetimeFigureOut">
               <a:rPr lang="en-US" smtClean="0"/>
               <a:pPr/>
-              <a:t>8/27/2018</a:t>
+              <a:t>12/7/2018</a:t>
             </a:fld>
             <a:endParaRPr lang="en-US"/>
           </a:p>
@@ -2412,7 +2412,7 @@
             <a:fld id="{1D8BD707-D9CF-40AE-B4C6-C98DA3205C09}" type="datetimeFigureOut">
               <a:rPr lang="en-US" smtClean="0"/>
               <a:pPr/>
-              <a:t>8/27/2018</a:t>
+              <a:t>12/7/2018</a:t>
             </a:fld>
             <a:endParaRPr lang="en-US"/>
           </a:p>
@@ -2686,7 +2686,7 @@
             <a:fld id="{1D8BD707-D9CF-40AE-B4C6-C98DA3205C09}" type="datetimeFigureOut">
               <a:rPr lang="en-US" smtClean="0"/>
               <a:pPr/>
-              <a:t>8/27/2018</a:t>
+              <a:t>12/7/2018</a:t>
             </a:fld>
             <a:endParaRPr lang="en-US"/>
           </a:p>
@@ -2936,7 +2936,7 @@
             <a:fld id="{1D8BD707-D9CF-40AE-B4C6-C98DA3205C09}" type="datetimeFigureOut">
               <a:rPr lang="en-US" smtClean="0"/>
               <a:pPr/>
-              <a:t>8/27/2018</a:t>
+              <a:t>12/7/2018</a:t>
             </a:fld>
             <a:endParaRPr lang="en-US"/>
           </a:p>
@@ -3146,7 +3146,7 @@
             <a:fld id="{1D8BD707-D9CF-40AE-B4C6-C98DA3205C09}" type="datetimeFigureOut">
               <a:rPr lang="en-US" smtClean="0"/>
               <a:pPr/>
-              <a:t>8/27/2018</a:t>
+              <a:t>12/7/2018</a:t>
             </a:fld>
             <a:endParaRPr lang="en-US"/>
           </a:p>
@@ -3957,11 +3957,6 @@
               </a:rPr>
               <a:t>Front-end developer</a:t>
             </a:r>
-            <a:endParaRPr lang="en-US" sz="1431" b="1" dirty="0">
-              <a:solidFill>
-                <a:schemeClr val="bg1"/>
-              </a:solidFill>
-            </a:endParaRPr>
           </a:p>
         </p:txBody>
       </p:sp>
@@ -3995,11 +3990,6 @@
               </a:rPr>
               <a:t>Test developer</a:t>
             </a:r>
-            <a:endParaRPr lang="en-US" sz="1431" b="1" dirty="0">
-              <a:solidFill>
-                <a:schemeClr val="bg1"/>
-              </a:solidFill>
-            </a:endParaRPr>
           </a:p>
         </p:txBody>
       </p:sp>
@@ -4037,11 +4027,6 @@
               </a:rPr>
               <a:t>DevOps developer</a:t>
             </a:r>
-            <a:endParaRPr lang="en-US" sz="1431" b="1" dirty="0">
-              <a:solidFill>
-                <a:schemeClr val="bg1"/>
-              </a:solidFill>
-            </a:endParaRPr>
           </a:p>
         </p:txBody>
       </p:sp>
@@ -4202,11 +4187,6 @@
               </a:rPr>
               <a:t>Back-end developer</a:t>
             </a:r>
-            <a:endParaRPr lang="en-US" sz="1431" b="1" dirty="0">
-              <a:solidFill>
-                <a:schemeClr val="bg1"/>
-              </a:solidFill>
-            </a:endParaRPr>
           </a:p>
         </p:txBody>
       </p:sp>
@@ -4262,45 +4242,8 @@
                 <a:latin typeface="Consolas" pitchFamily="49" charset="0"/>
                 <a:cs typeface="Consolas" pitchFamily="49" charset="0"/>
               </a:rPr>
-              <a:t>HTML, </a:t>
-            </a:r>
-            <a:r>
-              <a:rPr lang="en-SG" sz="1400" b="1" dirty="0">
-                <a:solidFill>
-                  <a:schemeClr val="tx1"/>
-                </a:solidFill>
-                <a:latin typeface="Consolas" pitchFamily="49" charset="0"/>
-                <a:cs typeface="Consolas" pitchFamily="49" charset="0"/>
-              </a:rPr>
-              <a:t>SCSS</a:t>
-            </a:r>
-            <a:r>
-              <a:rPr lang="en-SG" sz="1400" b="1" dirty="0">
-                <a:solidFill>
-                  <a:schemeClr val="tx1"/>
-                </a:solidFill>
-                <a:latin typeface="Consolas" pitchFamily="49" charset="0"/>
-                <a:cs typeface="Consolas" pitchFamily="49" charset="0"/>
-              </a:rPr>
-              <a:t>, </a:t>
-            </a:r>
-            <a:r>
-              <a:rPr lang="en-SG" sz="1400" b="1" dirty="0">
-                <a:solidFill>
-                  <a:schemeClr val="tx1"/>
-                </a:solidFill>
-                <a:latin typeface="Consolas" pitchFamily="49" charset="0"/>
-                <a:cs typeface="Consolas" pitchFamily="49" charset="0"/>
-              </a:rPr>
-              <a:t>Bootstrap</a:t>
-            </a:r>
-            <a:endParaRPr lang="en-SG" sz="1400" b="1" dirty="0">
-              <a:solidFill>
-                <a:schemeClr val="tx1"/>
-              </a:solidFill>
-              <a:latin typeface="Consolas" pitchFamily="49" charset="0"/>
-              <a:cs typeface="Consolas" pitchFamily="49" charset="0"/>
-            </a:endParaRPr>
+              <a:t>HTML, SCSS, Bootstrap</a:t>
+            </a:r>
           </a:p>
         </p:txBody>
       </p:sp>
@@ -4544,15 +4487,22 @@
           <a:p>
             <a:pPr algn="ctr"/>
             <a:r>
-              <a:rPr lang="en-US" sz="1400" b="1" dirty="0">
+              <a:rPr lang="en-US" sz="1400" b="1" dirty="0" smtClean="0">
                 <a:solidFill>
                   <a:schemeClr val="bg1"/>
                 </a:solidFill>
                 <a:latin typeface="Consolas" pitchFamily="49" charset="0"/>
                 <a:cs typeface="Consolas" pitchFamily="49" charset="0"/>
               </a:rPr>
-              <a:t>Jasmine</a:t>
-            </a:r>
+              <a:t>Jest</a:t>
+            </a:r>
+            <a:endParaRPr lang="en-US" sz="1400" b="1" dirty="0">
+              <a:solidFill>
+                <a:schemeClr val="bg1"/>
+              </a:solidFill>
+              <a:latin typeface="Consolas" pitchFamily="49" charset="0"/>
+              <a:cs typeface="Consolas" pitchFamily="49" charset="0"/>
+            </a:endParaRPr>
           </a:p>
         </p:txBody>
       </p:sp>

</xml_diff>

<commit_message>
[#9079] Set up PWA/SW architecture and migrate to Jest for testing (#9263)
* Fix broken image link in README

* Move all files other than WEB-INF to webapp-backup

* Move mockups folder to src/web

* Move tracking files to src/web

* Remove JS test files

* Remove MOTD feature

* Add webapp folder to gitignore

* Add longer cache expiration time for static files

* Add service worker and PWA support

* Use Jest to replace Karma/Jasmine

* Remove test.cases.pagedata

* Upgrade TestNG and remove use of Priority in component tests
</commit_message>
<xml_diff>
--- a/docs/images/RolesAndTechnologies.pptx
+++ b/docs/images/RolesAndTechnologies.pptx
@@ -208,7 +208,7 @@
           <a:p>
             <a:fld id="{EB56B9F1-9881-483D-AC17-B3C6E9A32E68}" type="datetimeFigureOut">
               <a:rPr lang="en-SG" smtClean="0"/>
-              <a:t>27/8/2018</a:t>
+              <a:t>7/12/2018</a:t>
             </a:fld>
             <a:endParaRPr lang="en-SG"/>
           </a:p>
@@ -747,7 +747,7 @@
             <a:fld id="{1D8BD707-D9CF-40AE-B4C6-C98DA3205C09}" type="datetimeFigureOut">
               <a:rPr lang="en-US" smtClean="0"/>
               <a:pPr/>
-              <a:t>8/27/2018</a:t>
+              <a:t>12/7/2018</a:t>
             </a:fld>
             <a:endParaRPr lang="en-US"/>
           </a:p>
@@ -914,7 +914,7 @@
             <a:fld id="{1D8BD707-D9CF-40AE-B4C6-C98DA3205C09}" type="datetimeFigureOut">
               <a:rPr lang="en-US" smtClean="0"/>
               <a:pPr/>
-              <a:t>8/27/2018</a:t>
+              <a:t>12/7/2018</a:t>
             </a:fld>
             <a:endParaRPr lang="en-US"/>
           </a:p>
@@ -1091,7 +1091,7 @@
             <a:fld id="{1D8BD707-D9CF-40AE-B4C6-C98DA3205C09}" type="datetimeFigureOut">
               <a:rPr lang="en-US" smtClean="0"/>
               <a:pPr/>
-              <a:t>8/27/2018</a:t>
+              <a:t>12/7/2018</a:t>
             </a:fld>
             <a:endParaRPr lang="en-US"/>
           </a:p>
@@ -1258,7 +1258,7 @@
             <a:fld id="{1D8BD707-D9CF-40AE-B4C6-C98DA3205C09}" type="datetimeFigureOut">
               <a:rPr lang="en-US" smtClean="0"/>
               <a:pPr/>
-              <a:t>8/27/2018</a:t>
+              <a:t>12/7/2018</a:t>
             </a:fld>
             <a:endParaRPr lang="en-US"/>
           </a:p>
@@ -1501,7 +1501,7 @@
             <a:fld id="{1D8BD707-D9CF-40AE-B4C6-C98DA3205C09}" type="datetimeFigureOut">
               <a:rPr lang="en-US" smtClean="0"/>
               <a:pPr/>
-              <a:t>8/27/2018</a:t>
+              <a:t>12/7/2018</a:t>
             </a:fld>
             <a:endParaRPr lang="en-US"/>
           </a:p>
@@ -1786,7 +1786,7 @@
             <a:fld id="{1D8BD707-D9CF-40AE-B4C6-C98DA3205C09}" type="datetimeFigureOut">
               <a:rPr lang="en-US" smtClean="0"/>
               <a:pPr/>
-              <a:t>8/27/2018</a:t>
+              <a:t>12/7/2018</a:t>
             </a:fld>
             <a:endParaRPr lang="en-US"/>
           </a:p>
@@ -2205,7 +2205,7 @@
             <a:fld id="{1D8BD707-D9CF-40AE-B4C6-C98DA3205C09}" type="datetimeFigureOut">
               <a:rPr lang="en-US" smtClean="0"/>
               <a:pPr/>
-              <a:t>8/27/2018</a:t>
+              <a:t>12/7/2018</a:t>
             </a:fld>
             <a:endParaRPr lang="en-US"/>
           </a:p>
@@ -2320,7 +2320,7 @@
             <a:fld id="{1D8BD707-D9CF-40AE-B4C6-C98DA3205C09}" type="datetimeFigureOut">
               <a:rPr lang="en-US" smtClean="0"/>
               <a:pPr/>
-              <a:t>8/27/2018</a:t>
+              <a:t>12/7/2018</a:t>
             </a:fld>
             <a:endParaRPr lang="en-US"/>
           </a:p>
@@ -2412,7 +2412,7 @@
             <a:fld id="{1D8BD707-D9CF-40AE-B4C6-C98DA3205C09}" type="datetimeFigureOut">
               <a:rPr lang="en-US" smtClean="0"/>
               <a:pPr/>
-              <a:t>8/27/2018</a:t>
+              <a:t>12/7/2018</a:t>
             </a:fld>
             <a:endParaRPr lang="en-US"/>
           </a:p>
@@ -2686,7 +2686,7 @@
             <a:fld id="{1D8BD707-D9CF-40AE-B4C6-C98DA3205C09}" type="datetimeFigureOut">
               <a:rPr lang="en-US" smtClean="0"/>
               <a:pPr/>
-              <a:t>8/27/2018</a:t>
+              <a:t>12/7/2018</a:t>
             </a:fld>
             <a:endParaRPr lang="en-US"/>
           </a:p>
@@ -2936,7 +2936,7 @@
             <a:fld id="{1D8BD707-D9CF-40AE-B4C6-C98DA3205C09}" type="datetimeFigureOut">
               <a:rPr lang="en-US" smtClean="0"/>
               <a:pPr/>
-              <a:t>8/27/2018</a:t>
+              <a:t>12/7/2018</a:t>
             </a:fld>
             <a:endParaRPr lang="en-US"/>
           </a:p>
@@ -3146,7 +3146,7 @@
             <a:fld id="{1D8BD707-D9CF-40AE-B4C6-C98DA3205C09}" type="datetimeFigureOut">
               <a:rPr lang="en-US" smtClean="0"/>
               <a:pPr/>
-              <a:t>8/27/2018</a:t>
+              <a:t>12/7/2018</a:t>
             </a:fld>
             <a:endParaRPr lang="en-US"/>
           </a:p>
@@ -3957,11 +3957,6 @@
               </a:rPr>
               <a:t>Front-end developer</a:t>
             </a:r>
-            <a:endParaRPr lang="en-US" sz="1431" b="1" dirty="0">
-              <a:solidFill>
-                <a:schemeClr val="bg1"/>
-              </a:solidFill>
-            </a:endParaRPr>
           </a:p>
         </p:txBody>
       </p:sp>
@@ -3995,11 +3990,6 @@
               </a:rPr>
               <a:t>Test developer</a:t>
             </a:r>
-            <a:endParaRPr lang="en-US" sz="1431" b="1" dirty="0">
-              <a:solidFill>
-                <a:schemeClr val="bg1"/>
-              </a:solidFill>
-            </a:endParaRPr>
           </a:p>
         </p:txBody>
       </p:sp>
@@ -4037,11 +4027,6 @@
               </a:rPr>
               <a:t>DevOps developer</a:t>
             </a:r>
-            <a:endParaRPr lang="en-US" sz="1431" b="1" dirty="0">
-              <a:solidFill>
-                <a:schemeClr val="bg1"/>
-              </a:solidFill>
-            </a:endParaRPr>
           </a:p>
         </p:txBody>
       </p:sp>
@@ -4202,11 +4187,6 @@
               </a:rPr>
               <a:t>Back-end developer</a:t>
             </a:r>
-            <a:endParaRPr lang="en-US" sz="1431" b="1" dirty="0">
-              <a:solidFill>
-                <a:schemeClr val="bg1"/>
-              </a:solidFill>
-            </a:endParaRPr>
           </a:p>
         </p:txBody>
       </p:sp>
@@ -4262,45 +4242,8 @@
                 <a:latin typeface="Consolas" pitchFamily="49" charset="0"/>
                 <a:cs typeface="Consolas" pitchFamily="49" charset="0"/>
               </a:rPr>
-              <a:t>HTML, </a:t>
-            </a:r>
-            <a:r>
-              <a:rPr lang="en-SG" sz="1400" b="1" dirty="0">
-                <a:solidFill>
-                  <a:schemeClr val="tx1"/>
-                </a:solidFill>
-                <a:latin typeface="Consolas" pitchFamily="49" charset="0"/>
-                <a:cs typeface="Consolas" pitchFamily="49" charset="0"/>
-              </a:rPr>
-              <a:t>SCSS</a:t>
-            </a:r>
-            <a:r>
-              <a:rPr lang="en-SG" sz="1400" b="1" dirty="0">
-                <a:solidFill>
-                  <a:schemeClr val="tx1"/>
-                </a:solidFill>
-                <a:latin typeface="Consolas" pitchFamily="49" charset="0"/>
-                <a:cs typeface="Consolas" pitchFamily="49" charset="0"/>
-              </a:rPr>
-              <a:t>, </a:t>
-            </a:r>
-            <a:r>
-              <a:rPr lang="en-SG" sz="1400" b="1" dirty="0">
-                <a:solidFill>
-                  <a:schemeClr val="tx1"/>
-                </a:solidFill>
-                <a:latin typeface="Consolas" pitchFamily="49" charset="0"/>
-                <a:cs typeface="Consolas" pitchFamily="49" charset="0"/>
-              </a:rPr>
-              <a:t>Bootstrap</a:t>
-            </a:r>
-            <a:endParaRPr lang="en-SG" sz="1400" b="1" dirty="0">
-              <a:solidFill>
-                <a:schemeClr val="tx1"/>
-              </a:solidFill>
-              <a:latin typeface="Consolas" pitchFamily="49" charset="0"/>
-              <a:cs typeface="Consolas" pitchFamily="49" charset="0"/>
-            </a:endParaRPr>
+              <a:t>HTML, SCSS, Bootstrap</a:t>
+            </a:r>
           </a:p>
         </p:txBody>
       </p:sp>
@@ -4544,15 +4487,22 @@
           <a:p>
             <a:pPr algn="ctr"/>
             <a:r>
-              <a:rPr lang="en-US" sz="1400" b="1" dirty="0">
+              <a:rPr lang="en-US" sz="1400" b="1" dirty="0" smtClean="0">
                 <a:solidFill>
                   <a:schemeClr val="bg1"/>
                 </a:solidFill>
                 <a:latin typeface="Consolas" pitchFamily="49" charset="0"/>
                 <a:cs typeface="Consolas" pitchFamily="49" charset="0"/>
               </a:rPr>
-              <a:t>Jasmine</a:t>
-            </a:r>
+              <a:t>Jest</a:t>
+            </a:r>
+            <a:endParaRPr lang="en-US" sz="1400" b="1" dirty="0">
+              <a:solidFill>
+                <a:schemeClr val="bg1"/>
+              </a:solidFill>
+              <a:latin typeface="Consolas" pitchFamily="49" charset="0"/>
+              <a:cs typeface="Consolas" pitchFamily="49" charset="0"/>
+            </a:endParaRPr>
           </a:p>
         </p:txBody>
       </p:sp>

</xml_diff>

<commit_message>
Revert "[#9079] Set up PWA/SW architecture and migrate to Jest for testing (#9263)"
This reverts commit b9dd6dd638b3a5679247662642594e82dbd4155c.
</commit_message>
<xml_diff>
--- a/docs/images/RolesAndTechnologies.pptx
+++ b/docs/images/RolesAndTechnologies.pptx
@@ -208,7 +208,7 @@
           <a:p>
             <a:fld id="{EB56B9F1-9881-483D-AC17-B3C6E9A32E68}" type="datetimeFigureOut">
               <a:rPr lang="en-SG" smtClean="0"/>
-              <a:t>7/12/2018</a:t>
+              <a:t>27/8/2018</a:t>
             </a:fld>
             <a:endParaRPr lang="en-SG"/>
           </a:p>
@@ -747,7 +747,7 @@
             <a:fld id="{1D8BD707-D9CF-40AE-B4C6-C98DA3205C09}" type="datetimeFigureOut">
               <a:rPr lang="en-US" smtClean="0"/>
               <a:pPr/>
-              <a:t>12/7/2018</a:t>
+              <a:t>8/27/2018</a:t>
             </a:fld>
             <a:endParaRPr lang="en-US"/>
           </a:p>
@@ -914,7 +914,7 @@
             <a:fld id="{1D8BD707-D9CF-40AE-B4C6-C98DA3205C09}" type="datetimeFigureOut">
               <a:rPr lang="en-US" smtClean="0"/>
               <a:pPr/>
-              <a:t>12/7/2018</a:t>
+              <a:t>8/27/2018</a:t>
             </a:fld>
             <a:endParaRPr lang="en-US"/>
           </a:p>
@@ -1091,7 +1091,7 @@
             <a:fld id="{1D8BD707-D9CF-40AE-B4C6-C98DA3205C09}" type="datetimeFigureOut">
               <a:rPr lang="en-US" smtClean="0"/>
               <a:pPr/>
-              <a:t>12/7/2018</a:t>
+              <a:t>8/27/2018</a:t>
             </a:fld>
             <a:endParaRPr lang="en-US"/>
           </a:p>
@@ -1258,7 +1258,7 @@
             <a:fld id="{1D8BD707-D9CF-40AE-B4C6-C98DA3205C09}" type="datetimeFigureOut">
               <a:rPr lang="en-US" smtClean="0"/>
               <a:pPr/>
-              <a:t>12/7/2018</a:t>
+              <a:t>8/27/2018</a:t>
             </a:fld>
             <a:endParaRPr lang="en-US"/>
           </a:p>
@@ -1501,7 +1501,7 @@
             <a:fld id="{1D8BD707-D9CF-40AE-B4C6-C98DA3205C09}" type="datetimeFigureOut">
               <a:rPr lang="en-US" smtClean="0"/>
               <a:pPr/>
-              <a:t>12/7/2018</a:t>
+              <a:t>8/27/2018</a:t>
             </a:fld>
             <a:endParaRPr lang="en-US"/>
           </a:p>
@@ -1786,7 +1786,7 @@
             <a:fld id="{1D8BD707-D9CF-40AE-B4C6-C98DA3205C09}" type="datetimeFigureOut">
               <a:rPr lang="en-US" smtClean="0"/>
               <a:pPr/>
-              <a:t>12/7/2018</a:t>
+              <a:t>8/27/2018</a:t>
             </a:fld>
             <a:endParaRPr lang="en-US"/>
           </a:p>
@@ -2205,7 +2205,7 @@
             <a:fld id="{1D8BD707-D9CF-40AE-B4C6-C98DA3205C09}" type="datetimeFigureOut">
               <a:rPr lang="en-US" smtClean="0"/>
               <a:pPr/>
-              <a:t>12/7/2018</a:t>
+              <a:t>8/27/2018</a:t>
             </a:fld>
             <a:endParaRPr lang="en-US"/>
           </a:p>
@@ -2320,7 +2320,7 @@
             <a:fld id="{1D8BD707-D9CF-40AE-B4C6-C98DA3205C09}" type="datetimeFigureOut">
               <a:rPr lang="en-US" smtClean="0"/>
               <a:pPr/>
-              <a:t>12/7/2018</a:t>
+              <a:t>8/27/2018</a:t>
             </a:fld>
             <a:endParaRPr lang="en-US"/>
           </a:p>
@@ -2412,7 +2412,7 @@
             <a:fld id="{1D8BD707-D9CF-40AE-B4C6-C98DA3205C09}" type="datetimeFigureOut">
               <a:rPr lang="en-US" smtClean="0"/>
               <a:pPr/>
-              <a:t>12/7/2018</a:t>
+              <a:t>8/27/2018</a:t>
             </a:fld>
             <a:endParaRPr lang="en-US"/>
           </a:p>
@@ -2686,7 +2686,7 @@
             <a:fld id="{1D8BD707-D9CF-40AE-B4C6-C98DA3205C09}" type="datetimeFigureOut">
               <a:rPr lang="en-US" smtClean="0"/>
               <a:pPr/>
-              <a:t>12/7/2018</a:t>
+              <a:t>8/27/2018</a:t>
             </a:fld>
             <a:endParaRPr lang="en-US"/>
           </a:p>
@@ -2936,7 +2936,7 @@
             <a:fld id="{1D8BD707-D9CF-40AE-B4C6-C98DA3205C09}" type="datetimeFigureOut">
               <a:rPr lang="en-US" smtClean="0"/>
               <a:pPr/>
-              <a:t>12/7/2018</a:t>
+              <a:t>8/27/2018</a:t>
             </a:fld>
             <a:endParaRPr lang="en-US"/>
           </a:p>
@@ -3146,7 +3146,7 @@
             <a:fld id="{1D8BD707-D9CF-40AE-B4C6-C98DA3205C09}" type="datetimeFigureOut">
               <a:rPr lang="en-US" smtClean="0"/>
               <a:pPr/>
-              <a:t>12/7/2018</a:t>
+              <a:t>8/27/2018</a:t>
             </a:fld>
             <a:endParaRPr lang="en-US"/>
           </a:p>
@@ -3957,6 +3957,11 @@
               </a:rPr>
               <a:t>Front-end developer</a:t>
             </a:r>
+            <a:endParaRPr lang="en-US" sz="1431" b="1" dirty="0">
+              <a:solidFill>
+                <a:schemeClr val="bg1"/>
+              </a:solidFill>
+            </a:endParaRPr>
           </a:p>
         </p:txBody>
       </p:sp>
@@ -3990,6 +3995,11 @@
               </a:rPr>
               <a:t>Test developer</a:t>
             </a:r>
+            <a:endParaRPr lang="en-US" sz="1431" b="1" dirty="0">
+              <a:solidFill>
+                <a:schemeClr val="bg1"/>
+              </a:solidFill>
+            </a:endParaRPr>
           </a:p>
         </p:txBody>
       </p:sp>
@@ -4027,6 +4037,11 @@
               </a:rPr>
               <a:t>DevOps developer</a:t>
             </a:r>
+            <a:endParaRPr lang="en-US" sz="1431" b="1" dirty="0">
+              <a:solidFill>
+                <a:schemeClr val="bg1"/>
+              </a:solidFill>
+            </a:endParaRPr>
           </a:p>
         </p:txBody>
       </p:sp>
@@ -4187,6 +4202,11 @@
               </a:rPr>
               <a:t>Back-end developer</a:t>
             </a:r>
+            <a:endParaRPr lang="en-US" sz="1431" b="1" dirty="0">
+              <a:solidFill>
+                <a:schemeClr val="bg1"/>
+              </a:solidFill>
+            </a:endParaRPr>
           </a:p>
         </p:txBody>
       </p:sp>
@@ -4242,8 +4262,45 @@
                 <a:latin typeface="Consolas" pitchFamily="49" charset="0"/>
                 <a:cs typeface="Consolas" pitchFamily="49" charset="0"/>
               </a:rPr>
-              <a:t>HTML, SCSS, Bootstrap</a:t>
-            </a:r>
+              <a:t>HTML, </a:t>
+            </a:r>
+            <a:r>
+              <a:rPr lang="en-SG" sz="1400" b="1" dirty="0">
+                <a:solidFill>
+                  <a:schemeClr val="tx1"/>
+                </a:solidFill>
+                <a:latin typeface="Consolas" pitchFamily="49" charset="0"/>
+                <a:cs typeface="Consolas" pitchFamily="49" charset="0"/>
+              </a:rPr>
+              <a:t>SCSS</a:t>
+            </a:r>
+            <a:r>
+              <a:rPr lang="en-SG" sz="1400" b="1" dirty="0">
+                <a:solidFill>
+                  <a:schemeClr val="tx1"/>
+                </a:solidFill>
+                <a:latin typeface="Consolas" pitchFamily="49" charset="0"/>
+                <a:cs typeface="Consolas" pitchFamily="49" charset="0"/>
+              </a:rPr>
+              <a:t>, </a:t>
+            </a:r>
+            <a:r>
+              <a:rPr lang="en-SG" sz="1400" b="1" dirty="0">
+                <a:solidFill>
+                  <a:schemeClr val="tx1"/>
+                </a:solidFill>
+                <a:latin typeface="Consolas" pitchFamily="49" charset="0"/>
+                <a:cs typeface="Consolas" pitchFamily="49" charset="0"/>
+              </a:rPr>
+              <a:t>Bootstrap</a:t>
+            </a:r>
+            <a:endParaRPr lang="en-SG" sz="1400" b="1" dirty="0">
+              <a:solidFill>
+                <a:schemeClr val="tx1"/>
+              </a:solidFill>
+              <a:latin typeface="Consolas" pitchFamily="49" charset="0"/>
+              <a:cs typeface="Consolas" pitchFamily="49" charset="0"/>
+            </a:endParaRPr>
           </a:p>
         </p:txBody>
       </p:sp>
@@ -4487,22 +4544,15 @@
           <a:p>
             <a:pPr algn="ctr"/>
             <a:r>
-              <a:rPr lang="en-US" sz="1400" b="1" dirty="0" smtClean="0">
+              <a:rPr lang="en-US" sz="1400" b="1" dirty="0">
                 <a:solidFill>
                   <a:schemeClr val="bg1"/>
                 </a:solidFill>
                 <a:latin typeface="Consolas" pitchFamily="49" charset="0"/>
                 <a:cs typeface="Consolas" pitchFamily="49" charset="0"/>
               </a:rPr>
-              <a:t>Jest</a:t>
-            </a:r>
-            <a:endParaRPr lang="en-US" sz="1400" b="1" dirty="0">
-              <a:solidFill>
-                <a:schemeClr val="bg1"/>
-              </a:solidFill>
-              <a:latin typeface="Consolas" pitchFamily="49" charset="0"/>
-              <a:cs typeface="Consolas" pitchFamily="49" charset="0"/>
-            </a:endParaRPr>
+              <a:t>Jasmine</a:t>
+            </a:r>
           </a:p>
         </p:txBody>
       </p:sp>

</xml_diff>